<commit_message>
Refined models and added tests to SISONetwork.
</commit_message>
<xml_diff>
--- a/docs/figures.pptx
+++ b/docs/figures.pptx
@@ -8,8 +8,9 @@
     <p:sldId id="256" r:id="rId2"/>
     <p:sldId id="259" r:id="rId3"/>
     <p:sldId id="258" r:id="rId4"/>
-    <p:sldId id="260" r:id="rId5"/>
-    <p:sldId id="257" r:id="rId6"/>
+    <p:sldId id="261" r:id="rId5"/>
+    <p:sldId id="260" r:id="rId6"/>
+    <p:sldId id="257" r:id="rId7"/>
   </p:sldIdLst>
   <p:sldSz cx="12192000" cy="6858000"/>
   <p:notesSz cx="6858000" cy="9144000"/>
@@ -5692,6 +5693,2690 @@
           <a:chExt cx="0" cy="0"/>
         </a:xfrm>
       </p:grpSpPr>
+      <mc:AlternateContent xmlns:mc="http://schemas.openxmlformats.org/markup-compatibility/2006">
+        <mc:Choice xmlns:a14="http://schemas.microsoft.com/office/drawing/2010/main" Requires="a14">
+          <p:sp>
+            <p:nvSpPr>
+              <p:cNvPr id="33" name="TextBox 32">
+                <a:extLst>
+                  <a:ext uri="{FF2B5EF4-FFF2-40B4-BE49-F238E27FC236}">
+                    <a16:creationId xmlns:a16="http://schemas.microsoft.com/office/drawing/2014/main" id="{69E5A26B-0528-09FD-9CCE-29CDD10D9061}"/>
+                  </a:ext>
+                </a:extLst>
+              </p:cNvPr>
+              <p:cNvSpPr txBox="1"/>
+              <p:nvPr/>
+            </p:nvSpPr>
+            <p:spPr>
+              <a:xfrm>
+                <a:off x="4048800" y="2018290"/>
+                <a:ext cx="454099" cy="246221"/>
+              </a:xfrm>
+              <a:prstGeom prst="rect">
+                <a:avLst/>
+              </a:prstGeom>
+              <a:noFill/>
+            </p:spPr>
+            <p:txBody>
+              <a:bodyPr wrap="none" lIns="0" tIns="0" rIns="0" bIns="0" rtlCol="0">
+                <a:spAutoFit/>
+              </a:bodyPr>
+              <a:lstStyle/>
+              <a:p>
+                <a14:m>
+                  <m:oMathPara xmlns:m="http://schemas.openxmlformats.org/officeDocument/2006/math">
+                    <m:oMathParaPr>
+                      <m:jc m:val="centerGroup"/>
+                    </m:oMathParaPr>
+                    <m:oMath xmlns:m="http://schemas.openxmlformats.org/officeDocument/2006/math">
+                      <m:r>
+                        <a:rPr lang="en-US" sz="1600" b="0" i="1" smtClean="0">
+                          <a:solidFill>
+                            <a:schemeClr val="bg1"/>
+                          </a:solidFill>
+                          <a:latin typeface="Cambria Math" panose="02040503050406030204" pitchFamily="18" charset="0"/>
+                        </a:rPr>
+                        <m:t>𝐺</m:t>
+                      </m:r>
+                      <m:r>
+                        <a:rPr lang="en-US" sz="1600" b="0" i="1" smtClean="0">
+                          <a:solidFill>
+                            <a:schemeClr val="bg1"/>
+                          </a:solidFill>
+                          <a:latin typeface="Cambria Math" panose="02040503050406030204" pitchFamily="18" charset="0"/>
+                        </a:rPr>
+                        <m:t>(</m:t>
+                      </m:r>
+                      <m:r>
+                        <a:rPr lang="en-US" sz="1600" b="0" i="1" smtClean="0">
+                          <a:solidFill>
+                            <a:schemeClr val="bg1"/>
+                          </a:solidFill>
+                          <a:latin typeface="Cambria Math" panose="02040503050406030204" pitchFamily="18" charset="0"/>
+                        </a:rPr>
+                        <m:t>𝑠</m:t>
+                      </m:r>
+                      <m:r>
+                        <a:rPr lang="en-US" sz="1600" b="0" i="1" smtClean="0">
+                          <a:solidFill>
+                            <a:schemeClr val="bg1"/>
+                          </a:solidFill>
+                          <a:latin typeface="Cambria Math" panose="02040503050406030204" pitchFamily="18" charset="0"/>
+                        </a:rPr>
+                        <m:t>)</m:t>
+                      </m:r>
+                    </m:oMath>
+                  </m:oMathPara>
+                </a14:m>
+                <a:endParaRPr lang="en-US" sz="1600" dirty="0">
+                  <a:solidFill>
+                    <a:schemeClr val="bg1"/>
+                  </a:solidFill>
+                </a:endParaRPr>
+              </a:p>
+            </p:txBody>
+          </p:sp>
+        </mc:Choice>
+        <mc:Fallback>
+          <p:sp>
+            <p:nvSpPr>
+              <p:cNvPr id="33" name="TextBox 32">
+                <a:extLst>
+                  <a:ext uri="{FF2B5EF4-FFF2-40B4-BE49-F238E27FC236}">
+                    <a16:creationId xmlns:a16="http://schemas.microsoft.com/office/drawing/2014/main" id="{69E5A26B-0528-09FD-9CCE-29CDD10D9061}"/>
+                  </a:ext>
+                </a:extLst>
+              </p:cNvPr>
+              <p:cNvSpPr txBox="1">
+                <a:spLocks noRot="1" noChangeAspect="1" noMove="1" noResize="1" noEditPoints="1" noAdjustHandles="1" noChangeArrowheads="1" noChangeShapeType="1" noTextEdit="1"/>
+              </p:cNvSpPr>
+              <p:nvPr/>
+            </p:nvSpPr>
+            <p:spPr>
+              <a:xfrm>
+                <a:off x="4048800" y="2018290"/>
+                <a:ext cx="454099" cy="246221"/>
+              </a:xfrm>
+              <a:prstGeom prst="rect">
+                <a:avLst/>
+              </a:prstGeom>
+              <a:blipFill>
+                <a:blip r:embed="rId2"/>
+                <a:stretch>
+                  <a:fillRect l="-10811" r="-16216" b="-33333"/>
+                </a:stretch>
+              </a:blipFill>
+            </p:spPr>
+            <p:txBody>
+              <a:bodyPr/>
+              <a:lstStyle/>
+              <a:p>
+                <a:r>
+                  <a:rPr lang="en-US">
+                    <a:noFill/>
+                  </a:rPr>
+                  <a:t> </a:t>
+                </a:r>
+              </a:p>
+            </p:txBody>
+          </p:sp>
+        </mc:Fallback>
+      </mc:AlternateContent>
+      <mc:AlternateContent xmlns:mc="http://schemas.openxmlformats.org/markup-compatibility/2006">
+        <mc:Choice xmlns:a14="http://schemas.microsoft.com/office/drawing/2010/main" Requires="a14">
+          <p:sp>
+            <p:nvSpPr>
+              <p:cNvPr id="35" name="TextBox 34">
+                <a:extLst>
+                  <a:ext uri="{FF2B5EF4-FFF2-40B4-BE49-F238E27FC236}">
+                    <a16:creationId xmlns:a16="http://schemas.microsoft.com/office/drawing/2014/main" id="{9F28B733-4A15-FDFC-D69D-AF0020590042}"/>
+                  </a:ext>
+                </a:extLst>
+              </p:cNvPr>
+              <p:cNvSpPr txBox="1"/>
+              <p:nvPr/>
+            </p:nvSpPr>
+            <p:spPr>
+              <a:xfrm>
+                <a:off x="3636070" y="2274984"/>
+                <a:ext cx="505716" cy="276999"/>
+              </a:xfrm>
+              <a:prstGeom prst="rect">
+                <a:avLst/>
+              </a:prstGeom>
+              <a:noFill/>
+            </p:spPr>
+            <p:txBody>
+              <a:bodyPr wrap="none" lIns="0" tIns="0" rIns="0" bIns="0" rtlCol="0">
+                <a:spAutoFit/>
+              </a:bodyPr>
+              <a:lstStyle/>
+              <a:p>
+                <a14:m>
+                  <m:oMathPara xmlns:m="http://schemas.openxmlformats.org/officeDocument/2006/math">
+                    <m:oMathParaPr>
+                      <m:jc m:val="centerGroup"/>
+                    </m:oMathParaPr>
+                    <m:oMath xmlns:m="http://schemas.openxmlformats.org/officeDocument/2006/math">
+                      <m:sSub>
+                        <m:sSubPr>
+                          <m:ctrlPr>
+                            <a:rPr lang="en-US" b="0" i="1" smtClean="0">
+                              <a:solidFill>
+                                <a:schemeClr val="bg1"/>
+                              </a:solidFill>
+                              <a:latin typeface="Cambria Math" panose="02040503050406030204" pitchFamily="18" charset="0"/>
+                            </a:rPr>
+                          </m:ctrlPr>
+                        </m:sSubPr>
+                        <m:e>
+                          <m:r>
+                            <a:rPr lang="en-US" b="0" i="1" smtClean="0">
+                              <a:solidFill>
+                                <a:schemeClr val="bg1"/>
+                              </a:solidFill>
+                              <a:latin typeface="Cambria Math" panose="02040503050406030204" pitchFamily="18" charset="0"/>
+                            </a:rPr>
+                            <m:t>𝑁</m:t>
+                          </m:r>
+                          <m:r>
+                            <a:rPr lang="en-US" b="0" i="1" smtClean="0">
+                              <a:solidFill>
+                                <a:schemeClr val="bg1"/>
+                              </a:solidFill>
+                              <a:latin typeface="Cambria Math" panose="02040503050406030204" pitchFamily="18" charset="0"/>
+                            </a:rPr>
+                            <m:t>.</m:t>
+                          </m:r>
+                          <m:r>
+                            <a:rPr lang="en-US" b="0" i="1" smtClean="0">
+                              <a:solidFill>
+                                <a:schemeClr val="bg1"/>
+                              </a:solidFill>
+                              <a:latin typeface="Cambria Math" panose="02040503050406030204" pitchFamily="18" charset="0"/>
+                            </a:rPr>
+                            <m:t>𝑆</m:t>
+                          </m:r>
+                        </m:e>
+                        <m:sub>
+                          <m:r>
+                            <a:rPr lang="en-US" b="0" i="1" smtClean="0">
+                              <a:solidFill>
+                                <a:schemeClr val="bg1"/>
+                              </a:solidFill>
+                              <a:latin typeface="Cambria Math" panose="02040503050406030204" pitchFamily="18" charset="0"/>
+                            </a:rPr>
+                            <m:t>𝐼</m:t>
+                          </m:r>
+                        </m:sub>
+                      </m:sSub>
+                    </m:oMath>
+                  </m:oMathPara>
+                </a14:m>
+                <a:endParaRPr lang="en-US" dirty="0">
+                  <a:solidFill>
+                    <a:schemeClr val="bg1"/>
+                  </a:solidFill>
+                </a:endParaRPr>
+              </a:p>
+            </p:txBody>
+          </p:sp>
+        </mc:Choice>
+        <mc:Fallback>
+          <p:sp>
+            <p:nvSpPr>
+              <p:cNvPr id="35" name="TextBox 34">
+                <a:extLst>
+                  <a:ext uri="{FF2B5EF4-FFF2-40B4-BE49-F238E27FC236}">
+                    <a16:creationId xmlns:a16="http://schemas.microsoft.com/office/drawing/2014/main" id="{9F28B733-4A15-FDFC-D69D-AF0020590042}"/>
+                  </a:ext>
+                </a:extLst>
+              </p:cNvPr>
+              <p:cNvSpPr txBox="1">
+                <a:spLocks noRot="1" noChangeAspect="1" noMove="1" noResize="1" noEditPoints="1" noAdjustHandles="1" noChangeArrowheads="1" noChangeShapeType="1" noTextEdit="1"/>
+              </p:cNvSpPr>
+              <p:nvPr/>
+            </p:nvSpPr>
+            <p:spPr>
+              <a:xfrm>
+                <a:off x="3636070" y="2274984"/>
+                <a:ext cx="505716" cy="276999"/>
+              </a:xfrm>
+              <a:prstGeom prst="rect">
+                <a:avLst/>
+              </a:prstGeom>
+              <a:blipFill>
+                <a:blip r:embed="rId3"/>
+                <a:stretch>
+                  <a:fillRect l="-10000" r="-2500" b="-13043"/>
+                </a:stretch>
+              </a:blipFill>
+            </p:spPr>
+            <p:txBody>
+              <a:bodyPr/>
+              <a:lstStyle/>
+              <a:p>
+                <a:r>
+                  <a:rPr lang="en-US">
+                    <a:noFill/>
+                  </a:rPr>
+                  <a:t> </a:t>
+                </a:r>
+              </a:p>
+            </p:txBody>
+          </p:sp>
+        </mc:Fallback>
+      </mc:AlternateContent>
+      <p:cxnSp>
+        <p:nvCxnSpPr>
+          <p:cNvPr id="36" name="Straight Arrow Connector 35">
+            <a:extLst>
+              <a:ext uri="{FF2B5EF4-FFF2-40B4-BE49-F238E27FC236}">
+                <a16:creationId xmlns:a16="http://schemas.microsoft.com/office/drawing/2014/main" id="{B94E69BF-29BC-2F37-1F0C-D9F9D0A48382}"/>
+              </a:ext>
+            </a:extLst>
+          </p:cNvPr>
+          <p:cNvCxnSpPr>
+            <a:cxnSpLocks/>
+            <a:endCxn id="5" idx="1"/>
+          </p:cNvCxnSpPr>
+          <p:nvPr/>
+        </p:nvCxnSpPr>
+        <p:spPr>
+          <a:xfrm>
+            <a:off x="2956311" y="2403652"/>
+            <a:ext cx="656704" cy="14750"/>
+          </a:xfrm>
+          <a:prstGeom prst="straightConnector1">
+            <a:avLst/>
+          </a:prstGeom>
+          <a:ln w="19050">
+            <a:solidFill>
+              <a:srgbClr val="0070C0"/>
+            </a:solidFill>
+            <a:tailEnd type="triangle"/>
+          </a:ln>
+        </p:spPr>
+        <p:style>
+          <a:lnRef idx="1">
+            <a:schemeClr val="accent1"/>
+          </a:lnRef>
+          <a:fillRef idx="0">
+            <a:schemeClr val="accent1"/>
+          </a:fillRef>
+          <a:effectRef idx="0">
+            <a:schemeClr val="accent1"/>
+          </a:effectRef>
+          <a:fontRef idx="minor">
+            <a:schemeClr val="tx1"/>
+          </a:fontRef>
+        </p:style>
+      </p:cxnSp>
+      <mc:AlternateContent xmlns:mc="http://schemas.openxmlformats.org/markup-compatibility/2006">
+        <mc:Choice xmlns:a14="http://schemas.microsoft.com/office/drawing/2010/main" Requires="a14">
+          <p:sp>
+            <p:nvSpPr>
+              <p:cNvPr id="37" name="TextBox 36">
+                <a:extLst>
+                  <a:ext uri="{FF2B5EF4-FFF2-40B4-BE49-F238E27FC236}">
+                    <a16:creationId xmlns:a16="http://schemas.microsoft.com/office/drawing/2014/main" id="{5C45D2CA-7E84-A0D4-F174-D0DB4E03D65F}"/>
+                  </a:ext>
+                </a:extLst>
+              </p:cNvPr>
+              <p:cNvSpPr txBox="1"/>
+              <p:nvPr/>
+            </p:nvSpPr>
+            <p:spPr>
+              <a:xfrm>
+                <a:off x="3146309" y="2077068"/>
+                <a:ext cx="281552" cy="276999"/>
+              </a:xfrm>
+              <a:prstGeom prst="rect">
+                <a:avLst/>
+              </a:prstGeom>
+              <a:noFill/>
+            </p:spPr>
+            <p:txBody>
+              <a:bodyPr wrap="square" lIns="0" tIns="0" rIns="0" bIns="0" rtlCol="0">
+                <a:spAutoFit/>
+              </a:bodyPr>
+              <a:lstStyle/>
+              <a:p>
+                <a14:m>
+                  <m:oMathPara xmlns:m="http://schemas.openxmlformats.org/officeDocument/2006/math">
+                    <m:oMathParaPr>
+                      <m:jc m:val="centerGroup"/>
+                    </m:oMathParaPr>
+                    <m:oMath xmlns:m="http://schemas.openxmlformats.org/officeDocument/2006/math">
+                      <m:sSub>
+                        <m:sSubPr>
+                          <m:ctrlPr>
+                            <a:rPr lang="en-US" b="0" i="1" smtClean="0">
+                              <a:latin typeface="Cambria Math" panose="02040503050406030204" pitchFamily="18" charset="0"/>
+                            </a:rPr>
+                          </m:ctrlPr>
+                        </m:sSubPr>
+                        <m:e>
+                          <m:r>
+                            <a:rPr lang="en-US" b="0" i="1" smtClean="0">
+                              <a:latin typeface="Cambria Math" panose="02040503050406030204" pitchFamily="18" charset="0"/>
+                            </a:rPr>
+                            <m:t>𝑘</m:t>
+                          </m:r>
+                        </m:e>
+                        <m:sub>
+                          <m:r>
+                            <a:rPr lang="en-US" b="0" i="1" smtClean="0">
+                              <a:latin typeface="Cambria Math" panose="02040503050406030204" pitchFamily="18" charset="0"/>
+                            </a:rPr>
+                            <m:t>1</m:t>
+                          </m:r>
+                        </m:sub>
+                      </m:sSub>
+                    </m:oMath>
+                  </m:oMathPara>
+                </a14:m>
+                <a:endParaRPr lang="en-US" dirty="0"/>
+              </a:p>
+            </p:txBody>
+          </p:sp>
+        </mc:Choice>
+        <mc:Fallback>
+          <p:sp>
+            <p:nvSpPr>
+              <p:cNvPr id="37" name="TextBox 36">
+                <a:extLst>
+                  <a:ext uri="{FF2B5EF4-FFF2-40B4-BE49-F238E27FC236}">
+                    <a16:creationId xmlns:a16="http://schemas.microsoft.com/office/drawing/2014/main" id="{5C45D2CA-7E84-A0D4-F174-D0DB4E03D65F}"/>
+                  </a:ext>
+                </a:extLst>
+              </p:cNvPr>
+              <p:cNvSpPr txBox="1">
+                <a:spLocks noRot="1" noChangeAspect="1" noMove="1" noResize="1" noEditPoints="1" noAdjustHandles="1" noChangeArrowheads="1" noChangeShapeType="1" noTextEdit="1"/>
+              </p:cNvSpPr>
+              <p:nvPr/>
+            </p:nvSpPr>
+            <p:spPr>
+              <a:xfrm>
+                <a:off x="3146309" y="2077068"/>
+                <a:ext cx="281552" cy="276999"/>
+              </a:xfrm>
+              <a:prstGeom prst="rect">
+                <a:avLst/>
+              </a:prstGeom>
+              <a:blipFill>
+                <a:blip r:embed="rId4"/>
+                <a:stretch>
+                  <a:fillRect l="-17391" r="-8696" b="-13043"/>
+                </a:stretch>
+              </a:blipFill>
+            </p:spPr>
+            <p:txBody>
+              <a:bodyPr/>
+              <a:lstStyle/>
+              <a:p>
+                <a:r>
+                  <a:rPr lang="en-US">
+                    <a:noFill/>
+                  </a:rPr>
+                  <a:t> </a:t>
+                </a:r>
+              </a:p>
+            </p:txBody>
+          </p:sp>
+        </mc:Fallback>
+      </mc:AlternateContent>
+      <mc:AlternateContent xmlns:mc="http://schemas.openxmlformats.org/markup-compatibility/2006">
+        <mc:Choice xmlns:a14="http://schemas.microsoft.com/office/drawing/2010/main" Requires="a14">
+          <p:sp>
+            <p:nvSpPr>
+              <p:cNvPr id="54" name="TextBox 53">
+                <a:extLst>
+                  <a:ext uri="{FF2B5EF4-FFF2-40B4-BE49-F238E27FC236}">
+                    <a16:creationId xmlns:a16="http://schemas.microsoft.com/office/drawing/2014/main" id="{0D6E3ADB-C3FC-2405-DEB6-CB2BC9B01E51}"/>
+                  </a:ext>
+                </a:extLst>
+              </p:cNvPr>
+              <p:cNvSpPr txBox="1"/>
+              <p:nvPr/>
+            </p:nvSpPr>
+            <p:spPr>
+              <a:xfrm>
+                <a:off x="4329245" y="2289732"/>
+                <a:ext cx="555793" cy="276999"/>
+              </a:xfrm>
+              <a:prstGeom prst="rect">
+                <a:avLst/>
+              </a:prstGeom>
+              <a:noFill/>
+            </p:spPr>
+            <p:txBody>
+              <a:bodyPr wrap="none" lIns="0" tIns="0" rIns="0" bIns="0" rtlCol="0">
+                <a:spAutoFit/>
+              </a:bodyPr>
+              <a:lstStyle/>
+              <a:p>
+                <a14:m>
+                  <m:oMathPara xmlns:m="http://schemas.openxmlformats.org/officeDocument/2006/math">
+                    <m:oMathParaPr>
+                      <m:jc m:val="centerGroup"/>
+                    </m:oMathParaPr>
+                    <m:oMath xmlns:m="http://schemas.openxmlformats.org/officeDocument/2006/math">
+                      <m:sSub>
+                        <m:sSubPr>
+                          <m:ctrlPr>
+                            <a:rPr lang="en-US" b="0" i="1" smtClean="0">
+                              <a:solidFill>
+                                <a:schemeClr val="bg1"/>
+                              </a:solidFill>
+                              <a:latin typeface="Cambria Math" panose="02040503050406030204" pitchFamily="18" charset="0"/>
+                            </a:rPr>
+                          </m:ctrlPr>
+                        </m:sSubPr>
+                        <m:e>
+                          <m:r>
+                            <a:rPr lang="en-US" b="0" i="1" smtClean="0">
+                              <a:solidFill>
+                                <a:schemeClr val="bg1"/>
+                              </a:solidFill>
+                              <a:latin typeface="Cambria Math" panose="02040503050406030204" pitchFamily="18" charset="0"/>
+                            </a:rPr>
+                            <m:t>𝑁</m:t>
+                          </m:r>
+                          <m:r>
+                            <a:rPr lang="en-US" b="0" i="1" smtClean="0">
+                              <a:solidFill>
+                                <a:schemeClr val="bg1"/>
+                              </a:solidFill>
+                              <a:latin typeface="Cambria Math" panose="02040503050406030204" pitchFamily="18" charset="0"/>
+                            </a:rPr>
+                            <m:t>.</m:t>
+                          </m:r>
+                          <m:r>
+                            <a:rPr lang="en-US" b="0" i="1" smtClean="0">
+                              <a:solidFill>
+                                <a:schemeClr val="bg1"/>
+                              </a:solidFill>
+                              <a:latin typeface="Cambria Math" panose="02040503050406030204" pitchFamily="18" charset="0"/>
+                            </a:rPr>
+                            <m:t>𝑆</m:t>
+                          </m:r>
+                        </m:e>
+                        <m:sub>
+                          <m:r>
+                            <a:rPr lang="en-US" b="0" i="1" smtClean="0">
+                              <a:solidFill>
+                                <a:schemeClr val="bg1"/>
+                              </a:solidFill>
+                              <a:latin typeface="Cambria Math" panose="02040503050406030204" pitchFamily="18" charset="0"/>
+                            </a:rPr>
+                            <m:t>𝑂</m:t>
+                          </m:r>
+                        </m:sub>
+                      </m:sSub>
+                    </m:oMath>
+                  </m:oMathPara>
+                </a14:m>
+                <a:endParaRPr lang="en-US" dirty="0">
+                  <a:solidFill>
+                    <a:schemeClr val="bg1"/>
+                  </a:solidFill>
+                </a:endParaRPr>
+              </a:p>
+            </p:txBody>
+          </p:sp>
+        </mc:Choice>
+        <mc:Fallback>
+          <p:sp>
+            <p:nvSpPr>
+              <p:cNvPr id="54" name="TextBox 53">
+                <a:extLst>
+                  <a:ext uri="{FF2B5EF4-FFF2-40B4-BE49-F238E27FC236}">
+                    <a16:creationId xmlns:a16="http://schemas.microsoft.com/office/drawing/2014/main" id="{0D6E3ADB-C3FC-2405-DEB6-CB2BC9B01E51}"/>
+                  </a:ext>
+                </a:extLst>
+              </p:cNvPr>
+              <p:cNvSpPr txBox="1">
+                <a:spLocks noRot="1" noChangeAspect="1" noMove="1" noResize="1" noEditPoints="1" noAdjustHandles="1" noChangeArrowheads="1" noChangeShapeType="1" noTextEdit="1"/>
+              </p:cNvSpPr>
+              <p:nvPr/>
+            </p:nvSpPr>
+            <p:spPr>
+              <a:xfrm>
+                <a:off x="4329245" y="2289732"/>
+                <a:ext cx="555793" cy="276999"/>
+              </a:xfrm>
+              <a:prstGeom prst="rect">
+                <a:avLst/>
+              </a:prstGeom>
+              <a:blipFill>
+                <a:blip r:embed="rId5"/>
+                <a:stretch>
+                  <a:fillRect l="-8889" r="-2222" b="-13043"/>
+                </a:stretch>
+              </a:blipFill>
+            </p:spPr>
+            <p:txBody>
+              <a:bodyPr/>
+              <a:lstStyle/>
+              <a:p>
+                <a:r>
+                  <a:rPr lang="en-US">
+                    <a:noFill/>
+                  </a:rPr>
+                  <a:t> </a:t>
+                </a:r>
+              </a:p>
+            </p:txBody>
+          </p:sp>
+        </mc:Fallback>
+      </mc:AlternateContent>
+      <p:sp>
+        <p:nvSpPr>
+          <p:cNvPr id="64" name="Striped Right Arrow 63">
+            <a:extLst>
+              <a:ext uri="{FF2B5EF4-FFF2-40B4-BE49-F238E27FC236}">
+                <a16:creationId xmlns:a16="http://schemas.microsoft.com/office/drawing/2014/main" id="{89D840FD-D9EE-C33F-ED8E-53A7D7C66E12}"/>
+              </a:ext>
+            </a:extLst>
+          </p:cNvPr>
+          <p:cNvSpPr/>
+          <p:nvPr/>
+        </p:nvSpPr>
+        <p:spPr>
+          <a:xfrm>
+            <a:off x="1327352" y="2306177"/>
+            <a:ext cx="585117" cy="142055"/>
+          </a:xfrm>
+          <a:prstGeom prst="stripedRightArrow">
+            <a:avLst/>
+          </a:prstGeom>
+        </p:spPr>
+        <p:style>
+          <a:lnRef idx="2">
+            <a:schemeClr val="accent1">
+              <a:shade val="15000"/>
+            </a:schemeClr>
+          </a:lnRef>
+          <a:fillRef idx="1">
+            <a:schemeClr val="accent1"/>
+          </a:fillRef>
+          <a:effectRef idx="0">
+            <a:schemeClr val="accent1"/>
+          </a:effectRef>
+          <a:fontRef idx="minor">
+            <a:schemeClr val="lt1"/>
+          </a:fontRef>
+        </p:style>
+        <p:txBody>
+          <a:bodyPr rtlCol="0" anchor="ctr"/>
+          <a:lstStyle/>
+          <a:p>
+            <a:pPr algn="ctr"/>
+            <a:endParaRPr lang="en-US"/>
+          </a:p>
+        </p:txBody>
+      </p:sp>
+      <p:sp>
+        <p:nvSpPr>
+          <p:cNvPr id="65" name="Striped Right Arrow 64">
+            <a:extLst>
+              <a:ext uri="{FF2B5EF4-FFF2-40B4-BE49-F238E27FC236}">
+                <a16:creationId xmlns:a16="http://schemas.microsoft.com/office/drawing/2014/main" id="{59686BAC-87CA-92AB-2C70-57D46D1BB9F3}"/>
+              </a:ext>
+            </a:extLst>
+          </p:cNvPr>
+          <p:cNvSpPr/>
+          <p:nvPr/>
+        </p:nvSpPr>
+        <p:spPr>
+          <a:xfrm>
+            <a:off x="6242147" y="2368814"/>
+            <a:ext cx="585117" cy="142055"/>
+          </a:xfrm>
+          <a:prstGeom prst="stripedRightArrow">
+            <a:avLst/>
+          </a:prstGeom>
+        </p:spPr>
+        <p:style>
+          <a:lnRef idx="2">
+            <a:schemeClr val="accent1">
+              <a:shade val="15000"/>
+            </a:schemeClr>
+          </a:lnRef>
+          <a:fillRef idx="1">
+            <a:schemeClr val="accent1"/>
+          </a:fillRef>
+          <a:effectRef idx="0">
+            <a:schemeClr val="accent1"/>
+          </a:effectRef>
+          <a:fontRef idx="minor">
+            <a:schemeClr val="lt1"/>
+          </a:fontRef>
+        </p:style>
+        <p:txBody>
+          <a:bodyPr rtlCol="0" anchor="ctr"/>
+          <a:lstStyle/>
+          <a:p>
+            <a:pPr algn="ctr"/>
+            <a:endParaRPr lang="en-US"/>
+          </a:p>
+        </p:txBody>
+      </p:sp>
+      <mc:AlternateContent xmlns:mc="http://schemas.openxmlformats.org/markup-compatibility/2006">
+        <mc:Choice xmlns:a14="http://schemas.microsoft.com/office/drawing/2010/main" Requires="a14">
+          <p:sp>
+            <p:nvSpPr>
+              <p:cNvPr id="66" name="TextBox 65">
+                <a:extLst>
+                  <a:ext uri="{FF2B5EF4-FFF2-40B4-BE49-F238E27FC236}">
+                    <a16:creationId xmlns:a16="http://schemas.microsoft.com/office/drawing/2014/main" id="{C8A2958B-F7E0-8D43-1E37-2A7AC017332E}"/>
+                  </a:ext>
+                </a:extLst>
+              </p:cNvPr>
+              <p:cNvSpPr txBox="1"/>
+              <p:nvPr/>
+            </p:nvSpPr>
+            <p:spPr>
+              <a:xfrm>
+                <a:off x="2010351" y="2240572"/>
+                <a:ext cx="271933" cy="276999"/>
+              </a:xfrm>
+              <a:prstGeom prst="rect">
+                <a:avLst/>
+              </a:prstGeom>
+              <a:noFill/>
+            </p:spPr>
+            <p:txBody>
+              <a:bodyPr wrap="none" lIns="0" tIns="0" rIns="0" bIns="0" rtlCol="0">
+                <a:spAutoFit/>
+              </a:bodyPr>
+              <a:lstStyle/>
+              <a:p>
+                <a14:m>
+                  <m:oMathPara xmlns:m="http://schemas.openxmlformats.org/officeDocument/2006/math">
+                    <m:oMathParaPr>
+                      <m:jc m:val="centerGroup"/>
+                    </m:oMathParaPr>
+                    <m:oMath xmlns:m="http://schemas.openxmlformats.org/officeDocument/2006/math">
+                      <m:sSub>
+                        <m:sSubPr>
+                          <m:ctrlPr>
+                            <a:rPr lang="en-US" b="0" i="1" smtClean="0">
+                              <a:latin typeface="Cambria Math" panose="02040503050406030204" pitchFamily="18" charset="0"/>
+                            </a:rPr>
+                          </m:ctrlPr>
+                        </m:sSubPr>
+                        <m:e>
+                          <m:r>
+                            <a:rPr lang="en-US" b="0" i="1" smtClean="0">
+                              <a:latin typeface="Cambria Math" panose="02040503050406030204" pitchFamily="18" charset="0"/>
+                            </a:rPr>
+                            <m:t>𝑆</m:t>
+                          </m:r>
+                        </m:e>
+                        <m:sub>
+                          <m:r>
+                            <a:rPr lang="en-US" b="0" i="1" smtClean="0">
+                              <a:latin typeface="Cambria Math" panose="02040503050406030204" pitchFamily="18" charset="0"/>
+                            </a:rPr>
+                            <m:t>0</m:t>
+                          </m:r>
+                        </m:sub>
+                      </m:sSub>
+                    </m:oMath>
+                  </m:oMathPara>
+                </a14:m>
+                <a:endParaRPr lang="en-US" dirty="0"/>
+              </a:p>
+            </p:txBody>
+          </p:sp>
+        </mc:Choice>
+        <mc:Fallback>
+          <p:sp>
+            <p:nvSpPr>
+              <p:cNvPr id="66" name="TextBox 65">
+                <a:extLst>
+                  <a:ext uri="{FF2B5EF4-FFF2-40B4-BE49-F238E27FC236}">
+                    <a16:creationId xmlns:a16="http://schemas.microsoft.com/office/drawing/2014/main" id="{C8A2958B-F7E0-8D43-1E37-2A7AC017332E}"/>
+                  </a:ext>
+                </a:extLst>
+              </p:cNvPr>
+              <p:cNvSpPr txBox="1">
+                <a:spLocks noRot="1" noChangeAspect="1" noMove="1" noResize="1" noEditPoints="1" noAdjustHandles="1" noChangeArrowheads="1" noChangeShapeType="1" noTextEdit="1"/>
+              </p:cNvSpPr>
+              <p:nvPr/>
+            </p:nvSpPr>
+            <p:spPr>
+              <a:xfrm>
+                <a:off x="2010351" y="2240572"/>
+                <a:ext cx="271933" cy="276999"/>
+              </a:xfrm>
+              <a:prstGeom prst="rect">
+                <a:avLst/>
+              </a:prstGeom>
+              <a:blipFill>
+                <a:blip r:embed="rId6"/>
+                <a:stretch>
+                  <a:fillRect l="-18182" r="-4545" b="-13043"/>
+                </a:stretch>
+              </a:blipFill>
+            </p:spPr>
+            <p:txBody>
+              <a:bodyPr/>
+              <a:lstStyle/>
+              <a:p>
+                <a:r>
+                  <a:rPr lang="en-US">
+                    <a:noFill/>
+                  </a:rPr>
+                  <a:t> </a:t>
+                </a:r>
+              </a:p>
+            </p:txBody>
+          </p:sp>
+        </mc:Fallback>
+      </mc:AlternateContent>
+      <mc:AlternateContent xmlns:mc="http://schemas.openxmlformats.org/markup-compatibility/2006">
+        <mc:Choice xmlns:a14="http://schemas.microsoft.com/office/drawing/2010/main" Requires="a14">
+          <p:sp>
+            <p:nvSpPr>
+              <p:cNvPr id="68" name="TextBox 67">
+                <a:extLst>
+                  <a:ext uri="{FF2B5EF4-FFF2-40B4-BE49-F238E27FC236}">
+                    <a16:creationId xmlns:a16="http://schemas.microsoft.com/office/drawing/2014/main" id="{0BFA971C-BA8E-FFB7-FA69-CA3EDE55367A}"/>
+                  </a:ext>
+                </a:extLst>
+              </p:cNvPr>
+              <p:cNvSpPr txBox="1"/>
+              <p:nvPr/>
+            </p:nvSpPr>
+            <p:spPr>
+              <a:xfrm>
+                <a:off x="5880759" y="2301685"/>
+                <a:ext cx="304699" cy="276999"/>
+              </a:xfrm>
+              <a:prstGeom prst="rect">
+                <a:avLst/>
+              </a:prstGeom>
+              <a:noFill/>
+            </p:spPr>
+            <p:txBody>
+              <a:bodyPr wrap="none" lIns="0" tIns="0" rIns="0" bIns="0" rtlCol="0">
+                <a:spAutoFit/>
+              </a:bodyPr>
+              <a:lstStyle/>
+              <a:p>
+                <a14:m>
+                  <m:oMathPara xmlns:m="http://schemas.openxmlformats.org/officeDocument/2006/math">
+                    <m:oMathParaPr>
+                      <m:jc m:val="centerGroup"/>
+                    </m:oMathParaPr>
+                    <m:oMath xmlns:m="http://schemas.openxmlformats.org/officeDocument/2006/math">
+                      <m:sSub>
+                        <m:sSubPr>
+                          <m:ctrlPr>
+                            <a:rPr lang="en-US" b="0" i="1" smtClean="0">
+                              <a:latin typeface="Cambria Math" panose="02040503050406030204" pitchFamily="18" charset="0"/>
+                            </a:rPr>
+                          </m:ctrlPr>
+                        </m:sSubPr>
+                        <m:e>
+                          <m:r>
+                            <a:rPr lang="en-US" b="0" i="1" smtClean="0">
+                              <a:latin typeface="Cambria Math" panose="02040503050406030204" pitchFamily="18" charset="0"/>
+                            </a:rPr>
+                            <m:t>𝑆</m:t>
+                          </m:r>
+                        </m:e>
+                        <m:sub>
+                          <m:r>
+                            <a:rPr lang="en-US" b="0" i="1" smtClean="0">
+                              <a:latin typeface="Cambria Math" panose="02040503050406030204" pitchFamily="18" charset="0"/>
+                            </a:rPr>
+                            <m:t>𝑁</m:t>
+                          </m:r>
+                        </m:sub>
+                      </m:sSub>
+                    </m:oMath>
+                  </m:oMathPara>
+                </a14:m>
+                <a:endParaRPr lang="en-US" dirty="0"/>
+              </a:p>
+            </p:txBody>
+          </p:sp>
+        </mc:Choice>
+        <mc:Fallback>
+          <p:sp>
+            <p:nvSpPr>
+              <p:cNvPr id="68" name="TextBox 67">
+                <a:extLst>
+                  <a:ext uri="{FF2B5EF4-FFF2-40B4-BE49-F238E27FC236}">
+                    <a16:creationId xmlns:a16="http://schemas.microsoft.com/office/drawing/2014/main" id="{0BFA971C-BA8E-FFB7-FA69-CA3EDE55367A}"/>
+                  </a:ext>
+                </a:extLst>
+              </p:cNvPr>
+              <p:cNvSpPr txBox="1">
+                <a:spLocks noRot="1" noChangeAspect="1" noMove="1" noResize="1" noEditPoints="1" noAdjustHandles="1" noChangeArrowheads="1" noChangeShapeType="1" noTextEdit="1"/>
+              </p:cNvSpPr>
+              <p:nvPr/>
+            </p:nvSpPr>
+            <p:spPr>
+              <a:xfrm>
+                <a:off x="5880759" y="2301685"/>
+                <a:ext cx="304699" cy="276999"/>
+              </a:xfrm>
+              <a:prstGeom prst="rect">
+                <a:avLst/>
+              </a:prstGeom>
+              <a:blipFill>
+                <a:blip r:embed="rId7"/>
+                <a:stretch>
+                  <a:fillRect l="-20000" r="-4000" b="-8696"/>
+                </a:stretch>
+              </a:blipFill>
+            </p:spPr>
+            <p:txBody>
+              <a:bodyPr/>
+              <a:lstStyle/>
+              <a:p>
+                <a:r>
+                  <a:rPr lang="en-US">
+                    <a:noFill/>
+                  </a:rPr>
+                  <a:t> </a:t>
+                </a:r>
+              </a:p>
+            </p:txBody>
+          </p:sp>
+        </mc:Fallback>
+      </mc:AlternateContent>
+      <p:cxnSp>
+        <p:nvCxnSpPr>
+          <p:cNvPr id="69" name="Straight Arrow Connector 68">
+            <a:extLst>
+              <a:ext uri="{FF2B5EF4-FFF2-40B4-BE49-F238E27FC236}">
+                <a16:creationId xmlns:a16="http://schemas.microsoft.com/office/drawing/2014/main" id="{6B73C28D-92D6-29E9-997E-5CB7A6547EE9}"/>
+              </a:ext>
+            </a:extLst>
+          </p:cNvPr>
+          <p:cNvCxnSpPr>
+            <a:cxnSpLocks/>
+            <a:stCxn id="66" idx="3"/>
+            <a:endCxn id="2" idx="1"/>
+          </p:cNvCxnSpPr>
+          <p:nvPr/>
+        </p:nvCxnSpPr>
+        <p:spPr>
+          <a:xfrm>
+            <a:off x="2282284" y="2379072"/>
+            <a:ext cx="421243" cy="4915"/>
+          </a:xfrm>
+          <a:prstGeom prst="straightConnector1">
+            <a:avLst/>
+          </a:prstGeom>
+          <a:ln w="19050">
+            <a:solidFill>
+              <a:srgbClr val="0070C0"/>
+            </a:solidFill>
+            <a:tailEnd type="triangle"/>
+          </a:ln>
+        </p:spPr>
+        <p:style>
+          <a:lnRef idx="1">
+            <a:schemeClr val="accent1"/>
+          </a:lnRef>
+          <a:fillRef idx="0">
+            <a:schemeClr val="accent1"/>
+          </a:fillRef>
+          <a:effectRef idx="0">
+            <a:schemeClr val="accent1"/>
+          </a:effectRef>
+          <a:fontRef idx="minor">
+            <a:schemeClr val="tx1"/>
+          </a:fontRef>
+        </p:style>
+      </p:cxnSp>
+      <p:cxnSp>
+        <p:nvCxnSpPr>
+          <p:cNvPr id="72" name="Straight Arrow Connector 71">
+            <a:extLst>
+              <a:ext uri="{FF2B5EF4-FFF2-40B4-BE49-F238E27FC236}">
+                <a16:creationId xmlns:a16="http://schemas.microsoft.com/office/drawing/2014/main" id="{FD10E9B4-5A00-F415-559F-6BEB39870207}"/>
+              </a:ext>
+            </a:extLst>
+          </p:cNvPr>
+          <p:cNvCxnSpPr>
+            <a:cxnSpLocks/>
+            <a:endCxn id="68" idx="1"/>
+          </p:cNvCxnSpPr>
+          <p:nvPr/>
+        </p:nvCxnSpPr>
+        <p:spPr>
+          <a:xfrm>
+            <a:off x="5384912" y="2440185"/>
+            <a:ext cx="495847" cy="0"/>
+          </a:xfrm>
+          <a:prstGeom prst="straightConnector1">
+            <a:avLst/>
+          </a:prstGeom>
+          <a:ln w="19050">
+            <a:solidFill>
+              <a:srgbClr val="0070C0"/>
+            </a:solidFill>
+            <a:tailEnd type="triangle"/>
+          </a:ln>
+        </p:spPr>
+        <p:style>
+          <a:lnRef idx="1">
+            <a:schemeClr val="accent1"/>
+          </a:lnRef>
+          <a:fillRef idx="0">
+            <a:schemeClr val="accent1"/>
+          </a:fillRef>
+          <a:effectRef idx="0">
+            <a:schemeClr val="accent1"/>
+          </a:effectRef>
+          <a:fontRef idx="minor">
+            <a:schemeClr val="tx1"/>
+          </a:fontRef>
+        </p:style>
+      </p:cxnSp>
+      <mc:AlternateContent xmlns:mc="http://schemas.openxmlformats.org/markup-compatibility/2006">
+        <mc:Choice xmlns:a14="http://schemas.microsoft.com/office/drawing/2010/main" Requires="a14">
+          <p:sp>
+            <p:nvSpPr>
+              <p:cNvPr id="76" name="TextBox 75">
+                <a:extLst>
+                  <a:ext uri="{FF2B5EF4-FFF2-40B4-BE49-F238E27FC236}">
+                    <a16:creationId xmlns:a16="http://schemas.microsoft.com/office/drawing/2014/main" id="{6A17FF63-9BFC-DDBE-6E67-B48CA90BBD94}"/>
+                  </a:ext>
+                </a:extLst>
+              </p:cNvPr>
+              <p:cNvSpPr txBox="1"/>
+              <p:nvPr/>
+            </p:nvSpPr>
+            <p:spPr>
+              <a:xfrm>
+                <a:off x="2344981" y="2047572"/>
+                <a:ext cx="281552" cy="276999"/>
+              </a:xfrm>
+              <a:prstGeom prst="rect">
+                <a:avLst/>
+              </a:prstGeom>
+              <a:noFill/>
+            </p:spPr>
+            <p:txBody>
+              <a:bodyPr wrap="square" lIns="0" tIns="0" rIns="0" bIns="0" rtlCol="0">
+                <a:spAutoFit/>
+              </a:bodyPr>
+              <a:lstStyle/>
+              <a:p>
+                <a14:m>
+                  <m:oMathPara xmlns:m="http://schemas.openxmlformats.org/officeDocument/2006/math">
+                    <m:oMathParaPr>
+                      <m:jc m:val="centerGroup"/>
+                    </m:oMathParaPr>
+                    <m:oMath xmlns:m="http://schemas.openxmlformats.org/officeDocument/2006/math">
+                      <m:sSub>
+                        <m:sSubPr>
+                          <m:ctrlPr>
+                            <a:rPr lang="en-US" b="0" i="1" smtClean="0">
+                              <a:latin typeface="Cambria Math" panose="02040503050406030204" pitchFamily="18" charset="0"/>
+                            </a:rPr>
+                          </m:ctrlPr>
+                        </m:sSubPr>
+                        <m:e>
+                          <m:r>
+                            <a:rPr lang="en-US" b="0" i="1" smtClean="0">
+                              <a:latin typeface="Cambria Math" panose="02040503050406030204" pitchFamily="18" charset="0"/>
+                            </a:rPr>
+                            <m:t>𝑘</m:t>
+                          </m:r>
+                        </m:e>
+                        <m:sub>
+                          <m:r>
+                            <a:rPr lang="en-US" b="0" i="1" smtClean="0">
+                              <a:latin typeface="Cambria Math" panose="02040503050406030204" pitchFamily="18" charset="0"/>
+                            </a:rPr>
+                            <m:t>0</m:t>
+                          </m:r>
+                        </m:sub>
+                      </m:sSub>
+                    </m:oMath>
+                  </m:oMathPara>
+                </a14:m>
+                <a:endParaRPr lang="en-US" dirty="0"/>
+              </a:p>
+            </p:txBody>
+          </p:sp>
+        </mc:Choice>
+        <mc:Fallback>
+          <p:sp>
+            <p:nvSpPr>
+              <p:cNvPr id="76" name="TextBox 75">
+                <a:extLst>
+                  <a:ext uri="{FF2B5EF4-FFF2-40B4-BE49-F238E27FC236}">
+                    <a16:creationId xmlns:a16="http://schemas.microsoft.com/office/drawing/2014/main" id="{6A17FF63-9BFC-DDBE-6E67-B48CA90BBD94}"/>
+                  </a:ext>
+                </a:extLst>
+              </p:cNvPr>
+              <p:cNvSpPr txBox="1">
+                <a:spLocks noRot="1" noChangeAspect="1" noMove="1" noResize="1" noEditPoints="1" noAdjustHandles="1" noChangeArrowheads="1" noChangeShapeType="1" noTextEdit="1"/>
+              </p:cNvSpPr>
+              <p:nvPr/>
+            </p:nvSpPr>
+            <p:spPr>
+              <a:xfrm>
+                <a:off x="2344981" y="2047572"/>
+                <a:ext cx="281552" cy="276999"/>
+              </a:xfrm>
+              <a:prstGeom prst="rect">
+                <a:avLst/>
+              </a:prstGeom>
+              <a:blipFill>
+                <a:blip r:embed="rId8"/>
+                <a:stretch>
+                  <a:fillRect l="-17391" r="-8696" b="-18182"/>
+                </a:stretch>
+              </a:blipFill>
+            </p:spPr>
+            <p:txBody>
+              <a:bodyPr/>
+              <a:lstStyle/>
+              <a:p>
+                <a:r>
+                  <a:rPr lang="en-US">
+                    <a:noFill/>
+                  </a:rPr>
+                  <a:t> </a:t>
+                </a:r>
+              </a:p>
+            </p:txBody>
+          </p:sp>
+        </mc:Fallback>
+      </mc:AlternateContent>
+      <mc:AlternateContent xmlns:mc="http://schemas.openxmlformats.org/markup-compatibility/2006">
+        <mc:Choice xmlns:a14="http://schemas.microsoft.com/office/drawing/2010/main" Requires="a14">
+          <p:sp>
+            <p:nvSpPr>
+              <p:cNvPr id="77" name="TextBox 76">
+                <a:extLst>
+                  <a:ext uri="{FF2B5EF4-FFF2-40B4-BE49-F238E27FC236}">
+                    <a16:creationId xmlns:a16="http://schemas.microsoft.com/office/drawing/2014/main" id="{DEAC5CAB-5835-E0F9-D8FF-3ACA985C2E46}"/>
+                  </a:ext>
+                </a:extLst>
+              </p:cNvPr>
+              <p:cNvSpPr txBox="1"/>
+              <p:nvPr/>
+            </p:nvSpPr>
+            <p:spPr>
+              <a:xfrm>
+                <a:off x="5327746" y="2074273"/>
+                <a:ext cx="281552" cy="276999"/>
+              </a:xfrm>
+              <a:prstGeom prst="rect">
+                <a:avLst/>
+              </a:prstGeom>
+              <a:noFill/>
+            </p:spPr>
+            <p:txBody>
+              <a:bodyPr wrap="square" lIns="0" tIns="0" rIns="0" bIns="0" rtlCol="0">
+                <a:spAutoFit/>
+              </a:bodyPr>
+              <a:lstStyle/>
+              <a:p>
+                <a14:m>
+                  <m:oMathPara xmlns:m="http://schemas.openxmlformats.org/officeDocument/2006/math">
+                    <m:oMathParaPr>
+                      <m:jc m:val="centerGroup"/>
+                    </m:oMathParaPr>
+                    <m:oMath xmlns:m="http://schemas.openxmlformats.org/officeDocument/2006/math">
+                      <m:sSub>
+                        <m:sSubPr>
+                          <m:ctrlPr>
+                            <a:rPr lang="en-US" b="0" i="1" smtClean="0">
+                              <a:latin typeface="Cambria Math" panose="02040503050406030204" pitchFamily="18" charset="0"/>
+                            </a:rPr>
+                          </m:ctrlPr>
+                        </m:sSubPr>
+                        <m:e>
+                          <m:r>
+                            <a:rPr lang="en-US" b="0" i="1" smtClean="0">
+                              <a:latin typeface="Cambria Math" panose="02040503050406030204" pitchFamily="18" charset="0"/>
+                            </a:rPr>
+                            <m:t>𝑘</m:t>
+                          </m:r>
+                        </m:e>
+                        <m:sub>
+                          <m:r>
+                            <a:rPr lang="en-US" b="0" i="1" smtClean="0">
+                              <a:latin typeface="Cambria Math" panose="02040503050406030204" pitchFamily="18" charset="0"/>
+                            </a:rPr>
+                            <m:t>𝑁</m:t>
+                          </m:r>
+                          <m:r>
+                            <a:rPr lang="en-US" b="0" i="1" smtClean="0">
+                              <a:latin typeface="Cambria Math" panose="02040503050406030204" pitchFamily="18" charset="0"/>
+                            </a:rPr>
+                            <m:t>−1</m:t>
+                          </m:r>
+                        </m:sub>
+                      </m:sSub>
+                    </m:oMath>
+                  </m:oMathPara>
+                </a14:m>
+                <a:endParaRPr lang="en-US" dirty="0"/>
+              </a:p>
+            </p:txBody>
+          </p:sp>
+        </mc:Choice>
+        <mc:Fallback>
+          <p:sp>
+            <p:nvSpPr>
+              <p:cNvPr id="77" name="TextBox 76">
+                <a:extLst>
+                  <a:ext uri="{FF2B5EF4-FFF2-40B4-BE49-F238E27FC236}">
+                    <a16:creationId xmlns:a16="http://schemas.microsoft.com/office/drawing/2014/main" id="{DEAC5CAB-5835-E0F9-D8FF-3ACA985C2E46}"/>
+                  </a:ext>
+                </a:extLst>
+              </p:cNvPr>
+              <p:cNvSpPr txBox="1">
+                <a:spLocks noRot="1" noChangeAspect="1" noMove="1" noResize="1" noEditPoints="1" noAdjustHandles="1" noChangeArrowheads="1" noChangeShapeType="1" noTextEdit="1"/>
+              </p:cNvSpPr>
+              <p:nvPr/>
+            </p:nvSpPr>
+            <p:spPr>
+              <a:xfrm>
+                <a:off x="5327746" y="2074273"/>
+                <a:ext cx="281552" cy="276999"/>
+              </a:xfrm>
+              <a:prstGeom prst="rect">
+                <a:avLst/>
+              </a:prstGeom>
+              <a:blipFill>
+                <a:blip r:embed="rId9"/>
+                <a:stretch>
+                  <a:fillRect l="-30435" r="-82609" b="-13043"/>
+                </a:stretch>
+              </a:blipFill>
+            </p:spPr>
+            <p:txBody>
+              <a:bodyPr/>
+              <a:lstStyle/>
+              <a:p>
+                <a:r>
+                  <a:rPr lang="en-US">
+                    <a:noFill/>
+                  </a:rPr>
+                  <a:t> </a:t>
+                </a:r>
+              </a:p>
+            </p:txBody>
+          </p:sp>
+        </mc:Fallback>
+      </mc:AlternateContent>
+      <p:cxnSp>
+        <p:nvCxnSpPr>
+          <p:cNvPr id="78" name="Straight Arrow Connector 77">
+            <a:extLst>
+              <a:ext uri="{FF2B5EF4-FFF2-40B4-BE49-F238E27FC236}">
+                <a16:creationId xmlns:a16="http://schemas.microsoft.com/office/drawing/2014/main" id="{C37FD6ED-B723-42FF-5B4E-CA928633D11D}"/>
+              </a:ext>
+            </a:extLst>
+          </p:cNvPr>
+          <p:cNvCxnSpPr>
+            <a:cxnSpLocks/>
+            <a:endCxn id="83" idx="0"/>
+          </p:cNvCxnSpPr>
+          <p:nvPr/>
+        </p:nvCxnSpPr>
+        <p:spPr>
+          <a:xfrm>
+            <a:off x="2775247" y="2522487"/>
+            <a:ext cx="2623" cy="304293"/>
+          </a:xfrm>
+          <a:prstGeom prst="straightConnector1">
+            <a:avLst/>
+          </a:prstGeom>
+          <a:ln w="19050">
+            <a:solidFill>
+              <a:srgbClr val="0070C0"/>
+            </a:solidFill>
+            <a:tailEnd type="triangle"/>
+          </a:ln>
+        </p:spPr>
+        <p:style>
+          <a:lnRef idx="1">
+            <a:schemeClr val="accent1"/>
+          </a:lnRef>
+          <a:fillRef idx="0">
+            <a:schemeClr val="accent1"/>
+          </a:fillRef>
+          <a:effectRef idx="0">
+            <a:schemeClr val="accent1"/>
+          </a:effectRef>
+          <a:fontRef idx="minor">
+            <a:schemeClr val="tx1"/>
+          </a:fontRef>
+        </p:style>
+      </p:cxnSp>
+      <mc:AlternateContent xmlns:mc="http://schemas.openxmlformats.org/markup-compatibility/2006">
+        <mc:Choice xmlns:a14="http://schemas.microsoft.com/office/drawing/2010/main" Requires="a14">
+          <p:sp>
+            <p:nvSpPr>
+              <p:cNvPr id="83" name="TextBox 82">
+                <a:extLst>
+                  <a:ext uri="{FF2B5EF4-FFF2-40B4-BE49-F238E27FC236}">
+                    <a16:creationId xmlns:a16="http://schemas.microsoft.com/office/drawing/2014/main" id="{A333496A-DB0F-838C-DC04-9CC4FA4B87E1}"/>
+                  </a:ext>
+                </a:extLst>
+              </p:cNvPr>
+              <p:cNvSpPr txBox="1"/>
+              <p:nvPr/>
+            </p:nvSpPr>
+            <p:spPr>
+              <a:xfrm>
+                <a:off x="2679285" y="2826780"/>
+                <a:ext cx="197169" cy="276999"/>
+              </a:xfrm>
+              <a:prstGeom prst="rect">
+                <a:avLst/>
+              </a:prstGeom>
+              <a:noFill/>
+            </p:spPr>
+            <p:txBody>
+              <a:bodyPr wrap="none" lIns="0" tIns="0" rIns="0" bIns="0" rtlCol="0">
+                <a:spAutoFit/>
+              </a:bodyPr>
+              <a:lstStyle/>
+              <a:p>
+                <a14:m>
+                  <m:oMathPara xmlns:m="http://schemas.openxmlformats.org/officeDocument/2006/math">
+                    <m:oMathParaPr>
+                      <m:jc m:val="centerGroup"/>
+                    </m:oMathParaPr>
+                    <m:oMath xmlns:m="http://schemas.openxmlformats.org/officeDocument/2006/math">
+                      <m:r>
+                        <a:rPr lang="en-US" i="1" smtClean="0">
+                          <a:latin typeface="Cambria Math" panose="02040503050406030204" pitchFamily="18" charset="0"/>
+                          <a:ea typeface="Cambria Math" panose="02040503050406030204" pitchFamily="18" charset="0"/>
+                        </a:rPr>
+                        <m:t>∅</m:t>
+                      </m:r>
+                    </m:oMath>
+                  </m:oMathPara>
+                </a14:m>
+                <a:endParaRPr lang="en-US" dirty="0"/>
+              </a:p>
+            </p:txBody>
+          </p:sp>
+        </mc:Choice>
+        <mc:Fallback>
+          <p:sp>
+            <p:nvSpPr>
+              <p:cNvPr id="83" name="TextBox 82">
+                <a:extLst>
+                  <a:ext uri="{FF2B5EF4-FFF2-40B4-BE49-F238E27FC236}">
+                    <a16:creationId xmlns:a16="http://schemas.microsoft.com/office/drawing/2014/main" id="{A333496A-DB0F-838C-DC04-9CC4FA4B87E1}"/>
+                  </a:ext>
+                </a:extLst>
+              </p:cNvPr>
+              <p:cNvSpPr txBox="1">
+                <a:spLocks noRot="1" noChangeAspect="1" noMove="1" noResize="1" noEditPoints="1" noAdjustHandles="1" noChangeArrowheads="1" noChangeShapeType="1" noTextEdit="1"/>
+              </p:cNvSpPr>
+              <p:nvPr/>
+            </p:nvSpPr>
+            <p:spPr>
+              <a:xfrm>
+                <a:off x="2679285" y="2826780"/>
+                <a:ext cx="197169" cy="276999"/>
+              </a:xfrm>
+              <a:prstGeom prst="rect">
+                <a:avLst/>
+              </a:prstGeom>
+              <a:blipFill>
+                <a:blip r:embed="rId10"/>
+                <a:stretch>
+                  <a:fillRect l="-37500" r="-37500" b="-21739"/>
+                </a:stretch>
+              </a:blipFill>
+            </p:spPr>
+            <p:txBody>
+              <a:bodyPr/>
+              <a:lstStyle/>
+              <a:p>
+                <a:r>
+                  <a:rPr lang="en-US">
+                    <a:noFill/>
+                  </a:rPr>
+                  <a:t> </a:t>
+                </a:r>
+              </a:p>
+            </p:txBody>
+          </p:sp>
+        </mc:Fallback>
+      </mc:AlternateContent>
+      <p:sp>
+        <p:nvSpPr>
+          <p:cNvPr id="86" name="Title 85">
+            <a:extLst>
+              <a:ext uri="{FF2B5EF4-FFF2-40B4-BE49-F238E27FC236}">
+                <a16:creationId xmlns:a16="http://schemas.microsoft.com/office/drawing/2014/main" id="{52A30558-4A7C-340E-B8A4-599A1D03098C}"/>
+              </a:ext>
+            </a:extLst>
+          </p:cNvPr>
+          <p:cNvSpPr>
+            <a:spLocks noGrp="1"/>
+          </p:cNvSpPr>
+          <p:nvPr>
+            <p:ph type="title"/>
+          </p:nvPr>
+        </p:nvSpPr>
+        <p:spPr/>
+        <p:txBody>
+          <a:bodyPr/>
+          <a:lstStyle/>
+          <a:p>
+            <a:r>
+              <a:rPr lang="en-US" dirty="0"/>
+              <a:t>Sequential Pathway</a:t>
+            </a:r>
+          </a:p>
+        </p:txBody>
+      </p:sp>
+      <mc:AlternateContent xmlns:mc="http://schemas.openxmlformats.org/markup-compatibility/2006">
+        <mc:Choice xmlns:a14="http://schemas.microsoft.com/office/drawing/2010/main" Requires="a14">
+          <p:sp>
+            <p:nvSpPr>
+              <p:cNvPr id="2" name="TextBox 1">
+                <a:extLst>
+                  <a:ext uri="{FF2B5EF4-FFF2-40B4-BE49-F238E27FC236}">
+                    <a16:creationId xmlns:a16="http://schemas.microsoft.com/office/drawing/2014/main" id="{D3B9FACA-57DB-8F05-A742-69C950B473F5}"/>
+                  </a:ext>
+                </a:extLst>
+              </p:cNvPr>
+              <p:cNvSpPr txBox="1"/>
+              <p:nvPr/>
+            </p:nvSpPr>
+            <p:spPr>
+              <a:xfrm>
+                <a:off x="2703527" y="2245487"/>
+                <a:ext cx="266611" cy="276999"/>
+              </a:xfrm>
+              <a:prstGeom prst="rect">
+                <a:avLst/>
+              </a:prstGeom>
+              <a:noFill/>
+            </p:spPr>
+            <p:txBody>
+              <a:bodyPr wrap="none" lIns="0" tIns="0" rIns="0" bIns="0" rtlCol="0">
+                <a:spAutoFit/>
+              </a:bodyPr>
+              <a:lstStyle/>
+              <a:p>
+                <a14:m>
+                  <m:oMathPara xmlns:m="http://schemas.openxmlformats.org/officeDocument/2006/math">
+                    <m:oMathParaPr>
+                      <m:jc m:val="centerGroup"/>
+                    </m:oMathParaPr>
+                    <m:oMath xmlns:m="http://schemas.openxmlformats.org/officeDocument/2006/math">
+                      <m:sSub>
+                        <m:sSubPr>
+                          <m:ctrlPr>
+                            <a:rPr lang="en-US" b="0" i="1" smtClean="0">
+                              <a:latin typeface="Cambria Math" panose="02040503050406030204" pitchFamily="18" charset="0"/>
+                            </a:rPr>
+                          </m:ctrlPr>
+                        </m:sSubPr>
+                        <m:e>
+                          <m:r>
+                            <a:rPr lang="en-US" b="0" i="1" smtClean="0">
+                              <a:latin typeface="Cambria Math" panose="02040503050406030204" pitchFamily="18" charset="0"/>
+                            </a:rPr>
+                            <m:t>𝑆</m:t>
+                          </m:r>
+                        </m:e>
+                        <m:sub>
+                          <m:r>
+                            <a:rPr lang="en-US" b="0" i="1" smtClean="0">
+                              <a:latin typeface="Cambria Math" panose="02040503050406030204" pitchFamily="18" charset="0"/>
+                            </a:rPr>
+                            <m:t>1</m:t>
+                          </m:r>
+                        </m:sub>
+                      </m:sSub>
+                    </m:oMath>
+                  </m:oMathPara>
+                </a14:m>
+                <a:endParaRPr lang="en-US" dirty="0"/>
+              </a:p>
+            </p:txBody>
+          </p:sp>
+        </mc:Choice>
+        <mc:Fallback>
+          <p:sp>
+            <p:nvSpPr>
+              <p:cNvPr id="2" name="TextBox 1">
+                <a:extLst>
+                  <a:ext uri="{FF2B5EF4-FFF2-40B4-BE49-F238E27FC236}">
+                    <a16:creationId xmlns:a16="http://schemas.microsoft.com/office/drawing/2014/main" id="{D3B9FACA-57DB-8F05-A742-69C950B473F5}"/>
+                  </a:ext>
+                </a:extLst>
+              </p:cNvPr>
+              <p:cNvSpPr txBox="1">
+                <a:spLocks noRot="1" noChangeAspect="1" noMove="1" noResize="1" noEditPoints="1" noAdjustHandles="1" noChangeArrowheads="1" noChangeShapeType="1" noTextEdit="1"/>
+              </p:cNvSpPr>
+              <p:nvPr/>
+            </p:nvSpPr>
+            <p:spPr>
+              <a:xfrm>
+                <a:off x="2703527" y="2245487"/>
+                <a:ext cx="266611" cy="276999"/>
+              </a:xfrm>
+              <a:prstGeom prst="rect">
+                <a:avLst/>
+              </a:prstGeom>
+              <a:blipFill>
+                <a:blip r:embed="rId11"/>
+                <a:stretch>
+                  <a:fillRect l="-18182" r="-9091" b="-13043"/>
+                </a:stretch>
+              </a:blipFill>
+            </p:spPr>
+            <p:txBody>
+              <a:bodyPr/>
+              <a:lstStyle/>
+              <a:p>
+                <a:r>
+                  <a:rPr lang="en-US">
+                    <a:noFill/>
+                  </a:rPr>
+                  <a:t> </a:t>
+                </a:r>
+              </a:p>
+            </p:txBody>
+          </p:sp>
+        </mc:Fallback>
+      </mc:AlternateContent>
+      <mc:AlternateContent xmlns:mc="http://schemas.openxmlformats.org/markup-compatibility/2006">
+        <mc:Choice xmlns:a14="http://schemas.microsoft.com/office/drawing/2010/main" Requires="a14">
+          <p:sp>
+            <p:nvSpPr>
+              <p:cNvPr id="3" name="TextBox 2">
+                <a:extLst>
+                  <a:ext uri="{FF2B5EF4-FFF2-40B4-BE49-F238E27FC236}">
+                    <a16:creationId xmlns:a16="http://schemas.microsoft.com/office/drawing/2014/main" id="{851220E1-4119-0C04-0B4E-9B18530899B2}"/>
+                  </a:ext>
+                </a:extLst>
+              </p:cNvPr>
+              <p:cNvSpPr txBox="1"/>
+              <p:nvPr/>
+            </p:nvSpPr>
+            <p:spPr>
+              <a:xfrm>
+                <a:off x="2361793" y="2574106"/>
+                <a:ext cx="405239" cy="553998"/>
+              </a:xfrm>
+              <a:prstGeom prst="rect">
+                <a:avLst/>
+              </a:prstGeom>
+              <a:noFill/>
+            </p:spPr>
+            <p:txBody>
+              <a:bodyPr wrap="none" lIns="0" tIns="0" rIns="0" bIns="0" rtlCol="0">
+                <a:spAutoFit/>
+              </a:bodyPr>
+              <a:lstStyle/>
+              <a:p>
+                <a14:m>
+                  <m:oMathPara xmlns:m="http://schemas.openxmlformats.org/officeDocument/2006/math">
+                    <m:oMathParaPr>
+                      <m:jc m:val="centerGroup"/>
+                    </m:oMathParaPr>
+                    <m:oMath xmlns:m="http://schemas.openxmlformats.org/officeDocument/2006/math">
+                      <m:sSubSup>
+                        <m:sSubSupPr>
+                          <m:ctrlPr>
+                            <a:rPr lang="en-US" b="0" i="1" smtClean="0">
+                              <a:latin typeface="Cambria Math" panose="02040503050406030204" pitchFamily="18" charset="0"/>
+                            </a:rPr>
+                          </m:ctrlPr>
+                        </m:sSubSupPr>
+                        <m:e>
+                          <m:r>
+                            <a:rPr lang="en-US" b="0" i="1" smtClean="0">
+                              <a:latin typeface="Cambria Math" panose="02040503050406030204" pitchFamily="18" charset="0"/>
+                            </a:rPr>
+                            <m:t>𝑘</m:t>
+                          </m:r>
+                        </m:e>
+                        <m:sub>
+                          <m:r>
+                            <a:rPr lang="en-US" b="0" i="1" smtClean="0">
+                              <a:latin typeface="Cambria Math" panose="02040503050406030204" pitchFamily="18" charset="0"/>
+                            </a:rPr>
+                            <m:t>1</m:t>
+                          </m:r>
+                        </m:sub>
+                        <m:sup>
+                          <m:r>
+                            <a:rPr lang="en-US" b="0" i="1" smtClean="0">
+                              <a:latin typeface="Cambria Math" panose="02040503050406030204" pitchFamily="18" charset="0"/>
+                            </a:rPr>
+                            <m:t>′</m:t>
+                          </m:r>
+                        </m:sup>
+                      </m:sSubSup>
+                    </m:oMath>
+                  </m:oMathPara>
+                </a14:m>
+                <a:endParaRPr lang="en-US" b="0" dirty="0"/>
+              </a:p>
+              <a:p>
+                <a:endParaRPr lang="en-US" dirty="0"/>
+              </a:p>
+            </p:txBody>
+          </p:sp>
+        </mc:Choice>
+        <mc:Fallback>
+          <p:sp>
+            <p:nvSpPr>
+              <p:cNvPr id="3" name="TextBox 2">
+                <a:extLst>
+                  <a:ext uri="{FF2B5EF4-FFF2-40B4-BE49-F238E27FC236}">
+                    <a16:creationId xmlns:a16="http://schemas.microsoft.com/office/drawing/2014/main" id="{851220E1-4119-0C04-0B4E-9B18530899B2}"/>
+                  </a:ext>
+                </a:extLst>
+              </p:cNvPr>
+              <p:cNvSpPr txBox="1">
+                <a:spLocks noRot="1" noChangeAspect="1" noMove="1" noResize="1" noEditPoints="1" noAdjustHandles="1" noChangeArrowheads="1" noChangeShapeType="1" noTextEdit="1"/>
+              </p:cNvSpPr>
+              <p:nvPr/>
+            </p:nvSpPr>
+            <p:spPr>
+              <a:xfrm>
+                <a:off x="2361793" y="2574106"/>
+                <a:ext cx="405239" cy="553998"/>
+              </a:xfrm>
+              <a:prstGeom prst="rect">
+                <a:avLst/>
+              </a:prstGeom>
+              <a:blipFill>
+                <a:blip r:embed="rId12"/>
+                <a:stretch>
+                  <a:fillRect/>
+                </a:stretch>
+              </a:blipFill>
+            </p:spPr>
+            <p:txBody>
+              <a:bodyPr/>
+              <a:lstStyle/>
+              <a:p>
+                <a:r>
+                  <a:rPr lang="en-US">
+                    <a:noFill/>
+                  </a:rPr>
+                  <a:t> </a:t>
+                </a:r>
+              </a:p>
+            </p:txBody>
+          </p:sp>
+        </mc:Fallback>
+      </mc:AlternateContent>
+      <mc:AlternateContent xmlns:mc="http://schemas.openxmlformats.org/markup-compatibility/2006">
+        <mc:Choice xmlns:a14="http://schemas.microsoft.com/office/drawing/2010/main" Requires="a14">
+          <p:sp>
+            <p:nvSpPr>
+              <p:cNvPr id="5" name="TextBox 4">
+                <a:extLst>
+                  <a:ext uri="{FF2B5EF4-FFF2-40B4-BE49-F238E27FC236}">
+                    <a16:creationId xmlns:a16="http://schemas.microsoft.com/office/drawing/2014/main" id="{5A7DFFF6-1AD1-C410-8DEC-2E5E3D1518E7}"/>
+                  </a:ext>
+                </a:extLst>
+              </p:cNvPr>
+              <p:cNvSpPr txBox="1"/>
+              <p:nvPr/>
+            </p:nvSpPr>
+            <p:spPr>
+              <a:xfrm>
+                <a:off x="3613015" y="2279902"/>
+                <a:ext cx="271933" cy="276999"/>
+              </a:xfrm>
+              <a:prstGeom prst="rect">
+                <a:avLst/>
+              </a:prstGeom>
+              <a:noFill/>
+            </p:spPr>
+            <p:txBody>
+              <a:bodyPr wrap="none" lIns="0" tIns="0" rIns="0" bIns="0" rtlCol="0">
+                <a:spAutoFit/>
+              </a:bodyPr>
+              <a:lstStyle/>
+              <a:p>
+                <a14:m>
+                  <m:oMathPara xmlns:m="http://schemas.openxmlformats.org/officeDocument/2006/math">
+                    <m:oMathParaPr>
+                      <m:jc m:val="centerGroup"/>
+                    </m:oMathParaPr>
+                    <m:oMath xmlns:m="http://schemas.openxmlformats.org/officeDocument/2006/math">
+                      <m:sSub>
+                        <m:sSubPr>
+                          <m:ctrlPr>
+                            <a:rPr lang="en-US" b="0" i="1" smtClean="0">
+                              <a:latin typeface="Cambria Math" panose="02040503050406030204" pitchFamily="18" charset="0"/>
+                            </a:rPr>
+                          </m:ctrlPr>
+                        </m:sSubPr>
+                        <m:e>
+                          <m:r>
+                            <a:rPr lang="en-US" b="0" i="1" smtClean="0">
+                              <a:latin typeface="Cambria Math" panose="02040503050406030204" pitchFamily="18" charset="0"/>
+                            </a:rPr>
+                            <m:t>𝑆</m:t>
+                          </m:r>
+                        </m:e>
+                        <m:sub>
+                          <m:r>
+                            <a:rPr lang="en-US" b="0" i="1" smtClean="0">
+                              <a:latin typeface="Cambria Math" panose="02040503050406030204" pitchFamily="18" charset="0"/>
+                            </a:rPr>
+                            <m:t>2</m:t>
+                          </m:r>
+                        </m:sub>
+                      </m:sSub>
+                    </m:oMath>
+                  </m:oMathPara>
+                </a14:m>
+                <a:endParaRPr lang="en-US" dirty="0"/>
+              </a:p>
+            </p:txBody>
+          </p:sp>
+        </mc:Choice>
+        <mc:Fallback>
+          <p:sp>
+            <p:nvSpPr>
+              <p:cNvPr id="5" name="TextBox 4">
+                <a:extLst>
+                  <a:ext uri="{FF2B5EF4-FFF2-40B4-BE49-F238E27FC236}">
+                    <a16:creationId xmlns:a16="http://schemas.microsoft.com/office/drawing/2014/main" id="{5A7DFFF6-1AD1-C410-8DEC-2E5E3D1518E7}"/>
+                  </a:ext>
+                </a:extLst>
+              </p:cNvPr>
+              <p:cNvSpPr txBox="1">
+                <a:spLocks noRot="1" noChangeAspect="1" noMove="1" noResize="1" noEditPoints="1" noAdjustHandles="1" noChangeArrowheads="1" noChangeShapeType="1" noTextEdit="1"/>
+              </p:cNvSpPr>
+              <p:nvPr/>
+            </p:nvSpPr>
+            <p:spPr>
+              <a:xfrm>
+                <a:off x="3613015" y="2279902"/>
+                <a:ext cx="271933" cy="276999"/>
+              </a:xfrm>
+              <a:prstGeom prst="rect">
+                <a:avLst/>
+              </a:prstGeom>
+              <a:blipFill>
+                <a:blip r:embed="rId13"/>
+                <a:stretch>
+                  <a:fillRect l="-18182" r="-9091" b="-13043"/>
+                </a:stretch>
+              </a:blipFill>
+            </p:spPr>
+            <p:txBody>
+              <a:bodyPr/>
+              <a:lstStyle/>
+              <a:p>
+                <a:r>
+                  <a:rPr lang="en-US">
+                    <a:noFill/>
+                  </a:rPr>
+                  <a:t> </a:t>
+                </a:r>
+              </a:p>
+            </p:txBody>
+          </p:sp>
+        </mc:Fallback>
+      </mc:AlternateContent>
+      <p:grpSp>
+        <p:nvGrpSpPr>
+          <p:cNvPr id="18" name="Group 17">
+            <a:extLst>
+              <a:ext uri="{FF2B5EF4-FFF2-40B4-BE49-F238E27FC236}">
+                <a16:creationId xmlns:a16="http://schemas.microsoft.com/office/drawing/2014/main" id="{CDAF7603-B505-0DF3-C162-75DFB4839A7B}"/>
+              </a:ext>
+            </a:extLst>
+          </p:cNvPr>
+          <p:cNvGrpSpPr/>
+          <p:nvPr/>
+        </p:nvGrpSpPr>
+        <p:grpSpPr>
+          <a:xfrm>
+            <a:off x="3290944" y="2556903"/>
+            <a:ext cx="514661" cy="605617"/>
+            <a:chOff x="3290944" y="2556903"/>
+            <a:chExt cx="514661" cy="605617"/>
+          </a:xfrm>
+        </p:grpSpPr>
+        <p:cxnSp>
+          <p:nvCxnSpPr>
+            <p:cNvPr id="7" name="Straight Arrow Connector 6">
+              <a:extLst>
+                <a:ext uri="{FF2B5EF4-FFF2-40B4-BE49-F238E27FC236}">
+                  <a16:creationId xmlns:a16="http://schemas.microsoft.com/office/drawing/2014/main" id="{31089EC9-D7D2-E3AF-7E73-D8DB8599FEDE}"/>
+                </a:ext>
+              </a:extLst>
+            </p:cNvPr>
+            <p:cNvCxnSpPr>
+              <a:cxnSpLocks/>
+              <a:endCxn id="8" idx="0"/>
+            </p:cNvCxnSpPr>
+            <p:nvPr/>
+          </p:nvCxnSpPr>
+          <p:spPr>
+            <a:xfrm>
+              <a:off x="3704398" y="2556903"/>
+              <a:ext cx="2623" cy="304293"/>
+            </a:xfrm>
+            <a:prstGeom prst="straightConnector1">
+              <a:avLst/>
+            </a:prstGeom>
+            <a:ln w="19050">
+              <a:solidFill>
+                <a:srgbClr val="0070C0"/>
+              </a:solidFill>
+              <a:tailEnd type="triangle"/>
+            </a:ln>
+          </p:spPr>
+          <p:style>
+            <a:lnRef idx="1">
+              <a:schemeClr val="accent1"/>
+            </a:lnRef>
+            <a:fillRef idx="0">
+              <a:schemeClr val="accent1"/>
+            </a:fillRef>
+            <a:effectRef idx="0">
+              <a:schemeClr val="accent1"/>
+            </a:effectRef>
+            <a:fontRef idx="minor">
+              <a:schemeClr val="tx1"/>
+            </a:fontRef>
+          </p:style>
+        </p:cxnSp>
+        <mc:AlternateContent xmlns:mc="http://schemas.openxmlformats.org/markup-compatibility/2006">
+          <mc:Choice xmlns:a14="http://schemas.microsoft.com/office/drawing/2010/main" Requires="a14">
+            <p:sp>
+              <p:nvSpPr>
+                <p:cNvPr id="8" name="TextBox 7">
+                  <a:extLst>
+                    <a:ext uri="{FF2B5EF4-FFF2-40B4-BE49-F238E27FC236}">
+                      <a16:creationId xmlns:a16="http://schemas.microsoft.com/office/drawing/2014/main" id="{5A705F41-8161-0BBD-D849-40FFDFA29C05}"/>
+                    </a:ext>
+                  </a:extLst>
+                </p:cNvPr>
+                <p:cNvSpPr txBox="1"/>
+                <p:nvPr/>
+              </p:nvSpPr>
+              <p:spPr>
+                <a:xfrm>
+                  <a:off x="3608436" y="2861196"/>
+                  <a:ext cx="197169" cy="276999"/>
+                </a:xfrm>
+                <a:prstGeom prst="rect">
+                  <a:avLst/>
+                </a:prstGeom>
+                <a:noFill/>
+              </p:spPr>
+              <p:txBody>
+                <a:bodyPr wrap="none" lIns="0" tIns="0" rIns="0" bIns="0" rtlCol="0">
+                  <a:spAutoFit/>
+                </a:bodyPr>
+                <a:lstStyle/>
+                <a:p>
+                  <a14:m>
+                    <m:oMathPara xmlns:m="http://schemas.openxmlformats.org/officeDocument/2006/math">
+                      <m:oMathParaPr>
+                        <m:jc m:val="centerGroup"/>
+                      </m:oMathParaPr>
+                      <m:oMath xmlns:m="http://schemas.openxmlformats.org/officeDocument/2006/math">
+                        <m:r>
+                          <a:rPr lang="en-US" i="1" smtClean="0">
+                            <a:latin typeface="Cambria Math" panose="02040503050406030204" pitchFamily="18" charset="0"/>
+                            <a:ea typeface="Cambria Math" panose="02040503050406030204" pitchFamily="18" charset="0"/>
+                          </a:rPr>
+                          <m:t>∅</m:t>
+                        </m:r>
+                      </m:oMath>
+                    </m:oMathPara>
+                  </a14:m>
+                  <a:endParaRPr lang="en-US" dirty="0"/>
+                </a:p>
+              </p:txBody>
+            </p:sp>
+          </mc:Choice>
+          <mc:Fallback>
+            <p:sp>
+              <p:nvSpPr>
+                <p:cNvPr id="8" name="TextBox 7">
+                  <a:extLst>
+                    <a:ext uri="{FF2B5EF4-FFF2-40B4-BE49-F238E27FC236}">
+                      <a16:creationId xmlns:a16="http://schemas.microsoft.com/office/drawing/2014/main" id="{5A705F41-8161-0BBD-D849-40FFDFA29C05}"/>
+                    </a:ext>
+                  </a:extLst>
+                </p:cNvPr>
+                <p:cNvSpPr txBox="1">
+                  <a:spLocks noRot="1" noChangeAspect="1" noMove="1" noResize="1" noEditPoints="1" noAdjustHandles="1" noChangeArrowheads="1" noChangeShapeType="1" noTextEdit="1"/>
+                </p:cNvSpPr>
+                <p:nvPr/>
+              </p:nvSpPr>
+              <p:spPr>
+                <a:xfrm>
+                  <a:off x="3608436" y="2861196"/>
+                  <a:ext cx="197169" cy="276999"/>
+                </a:xfrm>
+                <a:prstGeom prst="rect">
+                  <a:avLst/>
+                </a:prstGeom>
+                <a:blipFill>
+                  <a:blip r:embed="rId14"/>
+                  <a:stretch>
+                    <a:fillRect l="-37500" r="-37500" b="-21739"/>
+                  </a:stretch>
+                </a:blipFill>
+              </p:spPr>
+              <p:txBody>
+                <a:bodyPr/>
+                <a:lstStyle/>
+                <a:p>
+                  <a:r>
+                    <a:rPr lang="en-US">
+                      <a:noFill/>
+                    </a:rPr>
+                    <a:t> </a:t>
+                  </a:r>
+                </a:p>
+              </p:txBody>
+            </p:sp>
+          </mc:Fallback>
+        </mc:AlternateContent>
+        <mc:AlternateContent xmlns:mc="http://schemas.openxmlformats.org/markup-compatibility/2006">
+          <mc:Choice xmlns:a14="http://schemas.microsoft.com/office/drawing/2010/main" Requires="a14">
+            <p:sp>
+              <p:nvSpPr>
+                <p:cNvPr id="10" name="TextBox 9">
+                  <a:extLst>
+                    <a:ext uri="{FF2B5EF4-FFF2-40B4-BE49-F238E27FC236}">
+                      <a16:creationId xmlns:a16="http://schemas.microsoft.com/office/drawing/2014/main" id="{A6BD3381-DCE2-1F9A-BF1D-36E1D8E5D886}"/>
+                    </a:ext>
+                  </a:extLst>
+                </p:cNvPr>
+                <p:cNvSpPr txBox="1"/>
+                <p:nvPr/>
+              </p:nvSpPr>
+              <p:spPr>
+                <a:xfrm>
+                  <a:off x="3290944" y="2608522"/>
+                  <a:ext cx="383054" cy="553998"/>
+                </a:xfrm>
+                <a:prstGeom prst="rect">
+                  <a:avLst/>
+                </a:prstGeom>
+                <a:noFill/>
+              </p:spPr>
+              <p:txBody>
+                <a:bodyPr wrap="none" lIns="0" tIns="0" rIns="0" bIns="0" rtlCol="0">
+                  <a:spAutoFit/>
+                </a:bodyPr>
+                <a:lstStyle/>
+                <a:p>
+                  <a14:m>
+                    <m:oMathPara xmlns:m="http://schemas.openxmlformats.org/officeDocument/2006/math">
+                      <m:oMathParaPr>
+                        <m:jc m:val="centerGroup"/>
+                      </m:oMathParaPr>
+                      <m:oMath xmlns:m="http://schemas.openxmlformats.org/officeDocument/2006/math">
+                        <m:sSubSup>
+                          <m:sSubSupPr>
+                            <m:ctrlPr>
+                              <a:rPr lang="en-US" b="0" i="1" smtClean="0">
+                                <a:latin typeface="Cambria Math" panose="02040503050406030204" pitchFamily="18" charset="0"/>
+                              </a:rPr>
+                            </m:ctrlPr>
+                          </m:sSubSupPr>
+                          <m:e>
+                            <m:r>
+                              <a:rPr lang="en-US" b="0" i="1" smtClean="0">
+                                <a:latin typeface="Cambria Math" panose="02040503050406030204" pitchFamily="18" charset="0"/>
+                              </a:rPr>
+                              <m:t>𝑘</m:t>
+                            </m:r>
+                          </m:e>
+                          <m:sub>
+                            <m:r>
+                              <a:rPr lang="en-US" b="0" i="1" smtClean="0">
+                                <a:latin typeface="Cambria Math" panose="02040503050406030204" pitchFamily="18" charset="0"/>
+                              </a:rPr>
+                              <m:t>2</m:t>
+                            </m:r>
+                          </m:sub>
+                          <m:sup>
+                            <m:r>
+                              <a:rPr lang="en-US" b="0" i="1" smtClean="0">
+                                <a:latin typeface="Cambria Math" panose="02040503050406030204" pitchFamily="18" charset="0"/>
+                              </a:rPr>
+                              <m:t>′</m:t>
+                            </m:r>
+                          </m:sup>
+                        </m:sSubSup>
+                      </m:oMath>
+                    </m:oMathPara>
+                  </a14:m>
+                  <a:endParaRPr lang="en-US" b="0" dirty="0"/>
+                </a:p>
+                <a:p>
+                  <a:endParaRPr lang="en-US" dirty="0"/>
+                </a:p>
+              </p:txBody>
+            </p:sp>
+          </mc:Choice>
+          <mc:Fallback>
+            <p:sp>
+              <p:nvSpPr>
+                <p:cNvPr id="10" name="TextBox 9">
+                  <a:extLst>
+                    <a:ext uri="{FF2B5EF4-FFF2-40B4-BE49-F238E27FC236}">
+                      <a16:creationId xmlns:a16="http://schemas.microsoft.com/office/drawing/2014/main" id="{A6BD3381-DCE2-1F9A-BF1D-36E1D8E5D886}"/>
+                    </a:ext>
+                  </a:extLst>
+                </p:cNvPr>
+                <p:cNvSpPr txBox="1">
+                  <a:spLocks noRot="1" noChangeAspect="1" noMove="1" noResize="1" noEditPoints="1" noAdjustHandles="1" noChangeArrowheads="1" noChangeShapeType="1" noTextEdit="1"/>
+                </p:cNvSpPr>
+                <p:nvPr/>
+              </p:nvSpPr>
+              <p:spPr>
+                <a:xfrm>
+                  <a:off x="3290944" y="2608522"/>
+                  <a:ext cx="383054" cy="553998"/>
+                </a:xfrm>
+                <a:prstGeom prst="rect">
+                  <a:avLst/>
+                </a:prstGeom>
+                <a:blipFill>
+                  <a:blip r:embed="rId15"/>
+                  <a:stretch>
+                    <a:fillRect l="-3226"/>
+                  </a:stretch>
+                </a:blipFill>
+              </p:spPr>
+              <p:txBody>
+                <a:bodyPr/>
+                <a:lstStyle/>
+                <a:p>
+                  <a:r>
+                    <a:rPr lang="en-US">
+                      <a:noFill/>
+                    </a:rPr>
+                    <a:t> </a:t>
+                  </a:r>
+                </a:p>
+              </p:txBody>
+            </p:sp>
+          </mc:Fallback>
+        </mc:AlternateContent>
+      </p:grpSp>
+      <p:cxnSp>
+        <p:nvCxnSpPr>
+          <p:cNvPr id="11" name="Straight Arrow Connector 10">
+            <a:extLst>
+              <a:ext uri="{FF2B5EF4-FFF2-40B4-BE49-F238E27FC236}">
+                <a16:creationId xmlns:a16="http://schemas.microsoft.com/office/drawing/2014/main" id="{AE98E054-F613-DC86-B217-571D5BA7FCE5}"/>
+              </a:ext>
+            </a:extLst>
+          </p:cNvPr>
+          <p:cNvCxnSpPr>
+            <a:cxnSpLocks/>
+          </p:cNvCxnSpPr>
+          <p:nvPr/>
+        </p:nvCxnSpPr>
+        <p:spPr>
+          <a:xfrm>
+            <a:off x="3905127" y="2418400"/>
+            <a:ext cx="656704" cy="14750"/>
+          </a:xfrm>
+          <a:prstGeom prst="straightConnector1">
+            <a:avLst/>
+          </a:prstGeom>
+          <a:ln w="19050">
+            <a:solidFill>
+              <a:srgbClr val="0070C0"/>
+            </a:solidFill>
+            <a:tailEnd type="triangle"/>
+          </a:ln>
+        </p:spPr>
+        <p:style>
+          <a:lnRef idx="1">
+            <a:schemeClr val="accent1"/>
+          </a:lnRef>
+          <a:fillRef idx="0">
+            <a:schemeClr val="accent1"/>
+          </a:fillRef>
+          <a:effectRef idx="0">
+            <a:schemeClr val="accent1"/>
+          </a:effectRef>
+          <a:fontRef idx="minor">
+            <a:schemeClr val="tx1"/>
+          </a:fontRef>
+        </p:style>
+      </p:cxnSp>
+      <mc:AlternateContent xmlns:mc="http://schemas.openxmlformats.org/markup-compatibility/2006">
+        <mc:Choice xmlns:a14="http://schemas.microsoft.com/office/drawing/2010/main" Requires="a14">
+          <p:sp>
+            <p:nvSpPr>
+              <p:cNvPr id="13" name="TextBox 12">
+                <a:extLst>
+                  <a:ext uri="{FF2B5EF4-FFF2-40B4-BE49-F238E27FC236}">
+                    <a16:creationId xmlns:a16="http://schemas.microsoft.com/office/drawing/2014/main" id="{7F529A77-D061-A013-26AD-6CE3764D7355}"/>
+                  </a:ext>
+                </a:extLst>
+              </p:cNvPr>
+              <p:cNvSpPr txBox="1"/>
+              <p:nvPr/>
+            </p:nvSpPr>
+            <p:spPr>
+              <a:xfrm>
+                <a:off x="4016463" y="2091815"/>
+                <a:ext cx="281552" cy="276999"/>
+              </a:xfrm>
+              <a:prstGeom prst="rect">
+                <a:avLst/>
+              </a:prstGeom>
+              <a:noFill/>
+            </p:spPr>
+            <p:txBody>
+              <a:bodyPr wrap="square" lIns="0" tIns="0" rIns="0" bIns="0" rtlCol="0">
+                <a:spAutoFit/>
+              </a:bodyPr>
+              <a:lstStyle/>
+              <a:p>
+                <a14:m>
+                  <m:oMathPara xmlns:m="http://schemas.openxmlformats.org/officeDocument/2006/math">
+                    <m:oMathParaPr>
+                      <m:jc m:val="centerGroup"/>
+                    </m:oMathParaPr>
+                    <m:oMath xmlns:m="http://schemas.openxmlformats.org/officeDocument/2006/math">
+                      <m:sSub>
+                        <m:sSubPr>
+                          <m:ctrlPr>
+                            <a:rPr lang="en-US" b="0" i="1" smtClean="0">
+                              <a:latin typeface="Cambria Math" panose="02040503050406030204" pitchFamily="18" charset="0"/>
+                            </a:rPr>
+                          </m:ctrlPr>
+                        </m:sSubPr>
+                        <m:e>
+                          <m:r>
+                            <a:rPr lang="en-US" b="0" i="1" smtClean="0">
+                              <a:latin typeface="Cambria Math" panose="02040503050406030204" pitchFamily="18" charset="0"/>
+                            </a:rPr>
+                            <m:t>𝑘</m:t>
+                          </m:r>
+                        </m:e>
+                        <m:sub>
+                          <m:r>
+                            <a:rPr lang="en-US" b="0" i="1" smtClean="0">
+                              <a:latin typeface="Cambria Math" panose="02040503050406030204" pitchFamily="18" charset="0"/>
+                            </a:rPr>
+                            <m:t>2</m:t>
+                          </m:r>
+                        </m:sub>
+                      </m:sSub>
+                    </m:oMath>
+                  </m:oMathPara>
+                </a14:m>
+                <a:endParaRPr lang="en-US" dirty="0"/>
+              </a:p>
+            </p:txBody>
+          </p:sp>
+        </mc:Choice>
+        <mc:Fallback>
+          <p:sp>
+            <p:nvSpPr>
+              <p:cNvPr id="13" name="TextBox 12">
+                <a:extLst>
+                  <a:ext uri="{FF2B5EF4-FFF2-40B4-BE49-F238E27FC236}">
+                    <a16:creationId xmlns:a16="http://schemas.microsoft.com/office/drawing/2014/main" id="{7F529A77-D061-A013-26AD-6CE3764D7355}"/>
+                  </a:ext>
+                </a:extLst>
+              </p:cNvPr>
+              <p:cNvSpPr txBox="1">
+                <a:spLocks noRot="1" noChangeAspect="1" noMove="1" noResize="1" noEditPoints="1" noAdjustHandles="1" noChangeArrowheads="1" noChangeShapeType="1" noTextEdit="1"/>
+              </p:cNvSpPr>
+              <p:nvPr/>
+            </p:nvSpPr>
+            <p:spPr>
+              <a:xfrm>
+                <a:off x="4016463" y="2091815"/>
+                <a:ext cx="281552" cy="276999"/>
+              </a:xfrm>
+              <a:prstGeom prst="rect">
+                <a:avLst/>
+              </a:prstGeom>
+              <a:blipFill>
+                <a:blip r:embed="rId16"/>
+                <a:stretch>
+                  <a:fillRect l="-21739" r="-4348" b="-13043"/>
+                </a:stretch>
+              </a:blipFill>
+            </p:spPr>
+            <p:txBody>
+              <a:bodyPr/>
+              <a:lstStyle/>
+              <a:p>
+                <a:r>
+                  <a:rPr lang="en-US">
+                    <a:noFill/>
+                  </a:rPr>
+                  <a:t> </a:t>
+                </a:r>
+              </a:p>
+            </p:txBody>
+          </p:sp>
+        </mc:Fallback>
+      </mc:AlternateContent>
+      <p:grpSp>
+        <p:nvGrpSpPr>
+          <p:cNvPr id="17" name="Group 16">
+            <a:extLst>
+              <a:ext uri="{FF2B5EF4-FFF2-40B4-BE49-F238E27FC236}">
+                <a16:creationId xmlns:a16="http://schemas.microsoft.com/office/drawing/2014/main" id="{E086ACD1-28CD-7162-EE3D-9F9EBDB007A2}"/>
+              </a:ext>
+            </a:extLst>
+          </p:cNvPr>
+          <p:cNvGrpSpPr/>
+          <p:nvPr/>
+        </p:nvGrpSpPr>
+        <p:grpSpPr>
+          <a:xfrm>
+            <a:off x="4775153" y="2397887"/>
+            <a:ext cx="353961" cy="49162"/>
+            <a:chOff x="5663380" y="5117690"/>
+            <a:chExt cx="353961" cy="49162"/>
+          </a:xfrm>
+        </p:grpSpPr>
+        <p:sp>
+          <p:nvSpPr>
+            <p:cNvPr id="14" name="Oval 13">
+              <a:extLst>
+                <a:ext uri="{FF2B5EF4-FFF2-40B4-BE49-F238E27FC236}">
+                  <a16:creationId xmlns:a16="http://schemas.microsoft.com/office/drawing/2014/main" id="{7A5BC7D5-EEDE-038D-623A-32D7ED8ABDC8}"/>
+                </a:ext>
+              </a:extLst>
+            </p:cNvPr>
+            <p:cNvSpPr/>
+            <p:nvPr/>
+          </p:nvSpPr>
+          <p:spPr>
+            <a:xfrm>
+              <a:off x="5663380" y="5117690"/>
+              <a:ext cx="49161" cy="49162"/>
+            </a:xfrm>
+            <a:prstGeom prst="ellipse">
+              <a:avLst/>
+            </a:prstGeom>
+            <a:solidFill>
+              <a:schemeClr val="tx1"/>
+            </a:solidFill>
+            <a:ln>
+              <a:noFill/>
+            </a:ln>
+          </p:spPr>
+          <p:style>
+            <a:lnRef idx="2">
+              <a:schemeClr val="accent1">
+                <a:shade val="15000"/>
+              </a:schemeClr>
+            </a:lnRef>
+            <a:fillRef idx="1">
+              <a:schemeClr val="accent1"/>
+            </a:fillRef>
+            <a:effectRef idx="0">
+              <a:schemeClr val="accent1"/>
+            </a:effectRef>
+            <a:fontRef idx="minor">
+              <a:schemeClr val="lt1"/>
+            </a:fontRef>
+          </p:style>
+          <p:txBody>
+            <a:bodyPr rtlCol="0" anchor="ctr"/>
+            <a:lstStyle/>
+            <a:p>
+              <a:pPr algn="ctr"/>
+              <a:endParaRPr lang="en-US"/>
+            </a:p>
+          </p:txBody>
+        </p:sp>
+        <p:sp>
+          <p:nvSpPr>
+            <p:cNvPr id="15" name="Oval 14">
+              <a:extLst>
+                <a:ext uri="{FF2B5EF4-FFF2-40B4-BE49-F238E27FC236}">
+                  <a16:creationId xmlns:a16="http://schemas.microsoft.com/office/drawing/2014/main" id="{258823D4-80C8-51D5-4548-C95289753C92}"/>
+                </a:ext>
+              </a:extLst>
+            </p:cNvPr>
+            <p:cNvSpPr/>
+            <p:nvPr/>
+          </p:nvSpPr>
+          <p:spPr>
+            <a:xfrm>
+              <a:off x="5815780" y="5117690"/>
+              <a:ext cx="49161" cy="49162"/>
+            </a:xfrm>
+            <a:prstGeom prst="ellipse">
+              <a:avLst/>
+            </a:prstGeom>
+            <a:solidFill>
+              <a:schemeClr val="tx1"/>
+            </a:solidFill>
+            <a:ln>
+              <a:noFill/>
+            </a:ln>
+          </p:spPr>
+          <p:style>
+            <a:lnRef idx="2">
+              <a:schemeClr val="accent1">
+                <a:shade val="15000"/>
+              </a:schemeClr>
+            </a:lnRef>
+            <a:fillRef idx="1">
+              <a:schemeClr val="accent1"/>
+            </a:fillRef>
+            <a:effectRef idx="0">
+              <a:schemeClr val="accent1"/>
+            </a:effectRef>
+            <a:fontRef idx="minor">
+              <a:schemeClr val="lt1"/>
+            </a:fontRef>
+          </p:style>
+          <p:txBody>
+            <a:bodyPr rtlCol="0" anchor="ctr"/>
+            <a:lstStyle/>
+            <a:p>
+              <a:pPr algn="ctr"/>
+              <a:endParaRPr lang="en-US"/>
+            </a:p>
+          </p:txBody>
+        </p:sp>
+        <p:sp>
+          <p:nvSpPr>
+            <p:cNvPr id="16" name="Oval 15">
+              <a:extLst>
+                <a:ext uri="{FF2B5EF4-FFF2-40B4-BE49-F238E27FC236}">
+                  <a16:creationId xmlns:a16="http://schemas.microsoft.com/office/drawing/2014/main" id="{D6FD2956-73B9-F916-9F11-D157B6DE9B12}"/>
+                </a:ext>
+              </a:extLst>
+            </p:cNvPr>
+            <p:cNvSpPr/>
+            <p:nvPr/>
+          </p:nvSpPr>
+          <p:spPr>
+            <a:xfrm>
+              <a:off x="5968180" y="5117690"/>
+              <a:ext cx="49161" cy="49162"/>
+            </a:xfrm>
+            <a:prstGeom prst="ellipse">
+              <a:avLst/>
+            </a:prstGeom>
+            <a:solidFill>
+              <a:schemeClr val="tx1"/>
+            </a:solidFill>
+            <a:ln>
+              <a:noFill/>
+            </a:ln>
+          </p:spPr>
+          <p:style>
+            <a:lnRef idx="2">
+              <a:schemeClr val="accent1">
+                <a:shade val="15000"/>
+              </a:schemeClr>
+            </a:lnRef>
+            <a:fillRef idx="1">
+              <a:schemeClr val="accent1"/>
+            </a:fillRef>
+            <a:effectRef idx="0">
+              <a:schemeClr val="accent1"/>
+            </a:effectRef>
+            <a:fontRef idx="minor">
+              <a:schemeClr val="lt1"/>
+            </a:fontRef>
+          </p:style>
+          <p:txBody>
+            <a:bodyPr rtlCol="0" anchor="ctr"/>
+            <a:lstStyle/>
+            <a:p>
+              <a:pPr algn="ctr"/>
+              <a:endParaRPr lang="en-US"/>
+            </a:p>
+          </p:txBody>
+        </p:sp>
+      </p:grpSp>
+      <p:grpSp>
+        <p:nvGrpSpPr>
+          <p:cNvPr id="19" name="Group 18">
+            <a:extLst>
+              <a:ext uri="{FF2B5EF4-FFF2-40B4-BE49-F238E27FC236}">
+                <a16:creationId xmlns:a16="http://schemas.microsoft.com/office/drawing/2014/main" id="{E6DFE15C-F5D2-41DE-DCAF-10A25B61F09B}"/>
+              </a:ext>
+            </a:extLst>
+          </p:cNvPr>
+          <p:cNvGrpSpPr/>
+          <p:nvPr/>
+        </p:nvGrpSpPr>
+        <p:grpSpPr>
+          <a:xfrm>
+            <a:off x="5518447" y="2608522"/>
+            <a:ext cx="514661" cy="614465"/>
+            <a:chOff x="3290944" y="2556903"/>
+            <a:chExt cx="514661" cy="614465"/>
+          </a:xfrm>
+        </p:grpSpPr>
+        <p:cxnSp>
+          <p:nvCxnSpPr>
+            <p:cNvPr id="20" name="Straight Arrow Connector 19">
+              <a:extLst>
+                <a:ext uri="{FF2B5EF4-FFF2-40B4-BE49-F238E27FC236}">
+                  <a16:creationId xmlns:a16="http://schemas.microsoft.com/office/drawing/2014/main" id="{66FC748B-5B04-48D4-7FFD-A191C17ED5EE}"/>
+                </a:ext>
+              </a:extLst>
+            </p:cNvPr>
+            <p:cNvCxnSpPr>
+              <a:cxnSpLocks/>
+              <a:endCxn id="21" idx="0"/>
+            </p:cNvCxnSpPr>
+            <p:nvPr/>
+          </p:nvCxnSpPr>
+          <p:spPr>
+            <a:xfrm>
+              <a:off x="3704398" y="2556903"/>
+              <a:ext cx="2623" cy="304293"/>
+            </a:xfrm>
+            <a:prstGeom prst="straightConnector1">
+              <a:avLst/>
+            </a:prstGeom>
+            <a:ln w="19050">
+              <a:solidFill>
+                <a:srgbClr val="0070C0"/>
+              </a:solidFill>
+              <a:tailEnd type="triangle"/>
+            </a:ln>
+          </p:spPr>
+          <p:style>
+            <a:lnRef idx="1">
+              <a:schemeClr val="accent1"/>
+            </a:lnRef>
+            <a:fillRef idx="0">
+              <a:schemeClr val="accent1"/>
+            </a:fillRef>
+            <a:effectRef idx="0">
+              <a:schemeClr val="accent1"/>
+            </a:effectRef>
+            <a:fontRef idx="minor">
+              <a:schemeClr val="tx1"/>
+            </a:fontRef>
+          </p:style>
+        </p:cxnSp>
+        <mc:AlternateContent xmlns:mc="http://schemas.openxmlformats.org/markup-compatibility/2006">
+          <mc:Choice xmlns:a14="http://schemas.microsoft.com/office/drawing/2010/main" Requires="a14">
+            <p:sp>
+              <p:nvSpPr>
+                <p:cNvPr id="21" name="TextBox 20">
+                  <a:extLst>
+                    <a:ext uri="{FF2B5EF4-FFF2-40B4-BE49-F238E27FC236}">
+                      <a16:creationId xmlns:a16="http://schemas.microsoft.com/office/drawing/2014/main" id="{300D2E1E-DB16-D6CF-72D5-E888F9613FB5}"/>
+                    </a:ext>
+                  </a:extLst>
+                </p:cNvPr>
+                <p:cNvSpPr txBox="1"/>
+                <p:nvPr/>
+              </p:nvSpPr>
+              <p:spPr>
+                <a:xfrm>
+                  <a:off x="3608436" y="2861196"/>
+                  <a:ext cx="197169" cy="276999"/>
+                </a:xfrm>
+                <a:prstGeom prst="rect">
+                  <a:avLst/>
+                </a:prstGeom>
+                <a:noFill/>
+              </p:spPr>
+              <p:txBody>
+                <a:bodyPr wrap="none" lIns="0" tIns="0" rIns="0" bIns="0" rtlCol="0">
+                  <a:spAutoFit/>
+                </a:bodyPr>
+                <a:lstStyle/>
+                <a:p>
+                  <a14:m>
+                    <m:oMathPara xmlns:m="http://schemas.openxmlformats.org/officeDocument/2006/math">
+                      <m:oMathParaPr>
+                        <m:jc m:val="centerGroup"/>
+                      </m:oMathParaPr>
+                      <m:oMath xmlns:m="http://schemas.openxmlformats.org/officeDocument/2006/math">
+                        <m:r>
+                          <a:rPr lang="en-US" i="1" smtClean="0">
+                            <a:latin typeface="Cambria Math" panose="02040503050406030204" pitchFamily="18" charset="0"/>
+                            <a:ea typeface="Cambria Math" panose="02040503050406030204" pitchFamily="18" charset="0"/>
+                          </a:rPr>
+                          <m:t>∅</m:t>
+                        </m:r>
+                      </m:oMath>
+                    </m:oMathPara>
+                  </a14:m>
+                  <a:endParaRPr lang="en-US" dirty="0"/>
+                </a:p>
+              </p:txBody>
+            </p:sp>
+          </mc:Choice>
+          <mc:Fallback>
+            <p:sp>
+              <p:nvSpPr>
+                <p:cNvPr id="21" name="TextBox 20">
+                  <a:extLst>
+                    <a:ext uri="{FF2B5EF4-FFF2-40B4-BE49-F238E27FC236}">
+                      <a16:creationId xmlns:a16="http://schemas.microsoft.com/office/drawing/2014/main" id="{300D2E1E-DB16-D6CF-72D5-E888F9613FB5}"/>
+                    </a:ext>
+                  </a:extLst>
+                </p:cNvPr>
+                <p:cNvSpPr txBox="1">
+                  <a:spLocks noRot="1" noChangeAspect="1" noMove="1" noResize="1" noEditPoints="1" noAdjustHandles="1" noChangeArrowheads="1" noChangeShapeType="1" noTextEdit="1"/>
+                </p:cNvSpPr>
+                <p:nvPr/>
+              </p:nvSpPr>
+              <p:spPr>
+                <a:xfrm>
+                  <a:off x="3608436" y="2861196"/>
+                  <a:ext cx="197169" cy="276999"/>
+                </a:xfrm>
+                <a:prstGeom prst="rect">
+                  <a:avLst/>
+                </a:prstGeom>
+                <a:blipFill>
+                  <a:blip r:embed="rId17"/>
+                  <a:stretch>
+                    <a:fillRect l="-29412" r="-29412" b="-21739"/>
+                  </a:stretch>
+                </a:blipFill>
+              </p:spPr>
+              <p:txBody>
+                <a:bodyPr/>
+                <a:lstStyle/>
+                <a:p>
+                  <a:r>
+                    <a:rPr lang="en-US">
+                      <a:noFill/>
+                    </a:rPr>
+                    <a:t> </a:t>
+                  </a:r>
+                </a:p>
+              </p:txBody>
+            </p:sp>
+          </mc:Fallback>
+        </mc:AlternateContent>
+        <mc:AlternateContent xmlns:mc="http://schemas.openxmlformats.org/markup-compatibility/2006">
+          <mc:Choice xmlns:a14="http://schemas.microsoft.com/office/drawing/2010/main" Requires="a14">
+            <p:sp>
+              <p:nvSpPr>
+                <p:cNvPr id="22" name="TextBox 21">
+                  <a:extLst>
+                    <a:ext uri="{FF2B5EF4-FFF2-40B4-BE49-F238E27FC236}">
+                      <a16:creationId xmlns:a16="http://schemas.microsoft.com/office/drawing/2014/main" id="{9B0CFB5F-E12B-2486-9BD3-BEE73DDEB5BB}"/>
+                    </a:ext>
+                  </a:extLst>
+                </p:cNvPr>
+                <p:cNvSpPr txBox="1"/>
+                <p:nvPr/>
+              </p:nvSpPr>
+              <p:spPr>
+                <a:xfrm>
+                  <a:off x="3290944" y="2608522"/>
+                  <a:ext cx="391902" cy="562846"/>
+                </a:xfrm>
+                <a:prstGeom prst="rect">
+                  <a:avLst/>
+                </a:prstGeom>
+                <a:noFill/>
+              </p:spPr>
+              <p:txBody>
+                <a:bodyPr wrap="none" lIns="0" tIns="0" rIns="0" bIns="0" rtlCol="0">
+                  <a:spAutoFit/>
+                </a:bodyPr>
+                <a:lstStyle/>
+                <a:p>
+                  <a14:m>
+                    <m:oMathPara xmlns:m="http://schemas.openxmlformats.org/officeDocument/2006/math">
+                      <m:oMathParaPr>
+                        <m:jc m:val="centerGroup"/>
+                      </m:oMathParaPr>
+                      <m:oMath xmlns:m="http://schemas.openxmlformats.org/officeDocument/2006/math">
+                        <m:sSubSup>
+                          <m:sSubSupPr>
+                            <m:ctrlPr>
+                              <a:rPr lang="en-US" b="0" i="1" smtClean="0">
+                                <a:latin typeface="Cambria Math" panose="02040503050406030204" pitchFamily="18" charset="0"/>
+                              </a:rPr>
+                            </m:ctrlPr>
+                          </m:sSubSupPr>
+                          <m:e>
+                            <m:r>
+                              <a:rPr lang="en-US" b="0" i="1" smtClean="0">
+                                <a:latin typeface="Cambria Math" panose="02040503050406030204" pitchFamily="18" charset="0"/>
+                              </a:rPr>
+                              <m:t>𝑘</m:t>
+                            </m:r>
+                          </m:e>
+                          <m:sub>
+                            <m:r>
+                              <a:rPr lang="en-US" b="0" i="1" smtClean="0">
+                                <a:latin typeface="Cambria Math" panose="02040503050406030204" pitchFamily="18" charset="0"/>
+                              </a:rPr>
+                              <m:t>𝑁</m:t>
+                            </m:r>
+                          </m:sub>
+                          <m:sup>
+                            <m:r>
+                              <a:rPr lang="en-US" b="0" i="1" smtClean="0">
+                                <a:latin typeface="Cambria Math" panose="02040503050406030204" pitchFamily="18" charset="0"/>
+                              </a:rPr>
+                              <m:t>′</m:t>
+                            </m:r>
+                          </m:sup>
+                        </m:sSubSup>
+                      </m:oMath>
+                    </m:oMathPara>
+                  </a14:m>
+                  <a:endParaRPr lang="en-US" b="0" dirty="0"/>
+                </a:p>
+                <a:p>
+                  <a:endParaRPr lang="en-US" dirty="0"/>
+                </a:p>
+              </p:txBody>
+            </p:sp>
+          </mc:Choice>
+          <mc:Fallback>
+            <p:sp>
+              <p:nvSpPr>
+                <p:cNvPr id="22" name="TextBox 21">
+                  <a:extLst>
+                    <a:ext uri="{FF2B5EF4-FFF2-40B4-BE49-F238E27FC236}">
+                      <a16:creationId xmlns:a16="http://schemas.microsoft.com/office/drawing/2014/main" id="{9B0CFB5F-E12B-2486-9BD3-BEE73DDEB5BB}"/>
+                    </a:ext>
+                  </a:extLst>
+                </p:cNvPr>
+                <p:cNvSpPr txBox="1">
+                  <a:spLocks noRot="1" noChangeAspect="1" noMove="1" noResize="1" noEditPoints="1" noAdjustHandles="1" noChangeArrowheads="1" noChangeShapeType="1" noTextEdit="1"/>
+                </p:cNvSpPr>
+                <p:nvPr/>
+              </p:nvSpPr>
+              <p:spPr>
+                <a:xfrm>
+                  <a:off x="3290944" y="2608522"/>
+                  <a:ext cx="391902" cy="562846"/>
+                </a:xfrm>
+                <a:prstGeom prst="rect">
+                  <a:avLst/>
+                </a:prstGeom>
+                <a:blipFill>
+                  <a:blip r:embed="rId18"/>
+                  <a:stretch>
+                    <a:fillRect l="-6250"/>
+                  </a:stretch>
+                </a:blipFill>
+              </p:spPr>
+              <p:txBody>
+                <a:bodyPr/>
+                <a:lstStyle/>
+                <a:p>
+                  <a:r>
+                    <a:rPr lang="en-US">
+                      <a:noFill/>
+                    </a:rPr>
+                    <a:t> </a:t>
+                  </a:r>
+                </a:p>
+              </p:txBody>
+            </p:sp>
+          </mc:Fallback>
+        </mc:AlternateContent>
+      </p:grpSp>
+    </p:spTree>
+    <p:extLst>
+      <p:ext uri="{BB962C8B-B14F-4D97-AF65-F5344CB8AC3E}">
+        <p14:creationId xmlns:p14="http://schemas.microsoft.com/office/powerpoint/2010/main" val="3727905321"/>
+      </p:ext>
+    </p:extLst>
+  </p:cSld>
+  <p:clrMapOvr>
+    <a:masterClrMapping/>
+  </p:clrMapOvr>
+</p:sld>
+</file>
+
+<file path=ppt/slides/slide4.xml><?xml version="1.0" encoding="utf-8"?>
+<p:sld xmlns:a="http://schemas.openxmlformats.org/drawingml/2006/main" xmlns:r="http://schemas.openxmlformats.org/officeDocument/2006/relationships" xmlns:p="http://schemas.openxmlformats.org/presentationml/2006/main">
+  <p:cSld>
+    <p:spTree>
+      <p:nvGrpSpPr>
+        <p:cNvPr id="1" name=""/>
+        <p:cNvGrpSpPr/>
+        <p:nvPr/>
+      </p:nvGrpSpPr>
+      <p:grpSpPr>
+        <a:xfrm>
+          <a:off x="0" y="0"/>
+          <a:ext cx="0" cy="0"/>
+          <a:chOff x="0" y="0"/>
+          <a:chExt cx="0" cy="0"/>
+        </a:xfrm>
+      </p:grpSpPr>
       <p:sp>
         <p:nvSpPr>
           <p:cNvPr id="9" name="Rectangle 8">
@@ -7789,7 +10474,7 @@
     </p:spTree>
     <p:extLst>
       <p:ext uri="{BB962C8B-B14F-4D97-AF65-F5344CB8AC3E}">
-        <p14:creationId xmlns:p14="http://schemas.microsoft.com/office/powerpoint/2010/main" val="3727905321"/>
+        <p14:creationId xmlns:p14="http://schemas.microsoft.com/office/powerpoint/2010/main" val="1231347985"/>
       </p:ext>
     </p:extLst>
   </p:cSld>
@@ -7799,7 +10484,7 @@
 </p:sld>
 </file>
 
-<file path=ppt/slides/slide4.xml><?xml version="1.0" encoding="utf-8"?>
+<file path=ppt/slides/slide5.xml><?xml version="1.0" encoding="utf-8"?>
 <p:sld xmlns:a="http://schemas.openxmlformats.org/drawingml/2006/main" xmlns:r="http://schemas.openxmlformats.org/officeDocument/2006/relationships" xmlns:p="http://schemas.openxmlformats.org/presentationml/2006/main">
   <p:cSld>
     <p:spTree>
@@ -7857,7 +10542,7 @@
 </p:sld>
 </file>
 
-<file path=ppt/slides/slide5.xml><?xml version="1.0" encoding="utf-8"?>
+<file path=ppt/slides/slide6.xml><?xml version="1.0" encoding="utf-8"?>
 <p:sld xmlns:a="http://schemas.openxmlformats.org/drawingml/2006/main" xmlns:r="http://schemas.openxmlformats.org/officeDocument/2006/relationships" xmlns:p="http://schemas.openxmlformats.org/presentationml/2006/main">
   <p:cSld>
     <p:spTree>

</xml_diff>